<commit_message>
add benchmark to presentation
</commit_message>
<xml_diff>
--- a/Presentation/Caching-Team1.pptx
+++ b/Presentation/Caching-Team1.pptx
@@ -18,8 +18,8 @@
     <p:sldId id="266" r:id="rId9"/>
     <p:sldId id="267" r:id="rId10"/>
     <p:sldId id="269" r:id="rId11"/>
-    <p:sldId id="272" r:id="rId12"/>
-    <p:sldId id="270" r:id="rId13"/>
+    <p:sldId id="273" r:id="rId12"/>
+    <p:sldId id="274" r:id="rId13"/>
     <p:sldId id="271" r:id="rId14"/>
   </p:sldIdLst>
   <p:sldSz cx="12192000" cy="6858000"/>
@@ -121,7 +121,7 @@
   </p:defaultTextStyle>
   <p:extLst>
     <p:ext uri="{EFAFB233-063F-42B5-8137-9DF3F51BA10A}">
-      <p15:sldGuideLst xmlns:p15="http://schemas.microsoft.com/office/powerpoint/2012/main"/>
+      <p15:sldGuideLst xmlns:p15="http://schemas.microsoft.com/office/powerpoint/2012/main" xmlns=""/>
     </p:ext>
   </p:extLst>
 </p:presentation>
@@ -209,7 +209,7 @@
           <a:p>
             <a:fld id="{45C3BB5B-89FE-4146-B4B5-AC9351EE7F5C}" type="datetimeFigureOut">
               <a:rPr lang="fr-CH" smtClean="0"/>
-              <a:t>05.01.2014</a:t>
+              <a:t>05.01.14</a:t>
             </a:fld>
             <a:endParaRPr lang="fr-CH"/>
           </a:p>
@@ -368,7 +368,7 @@
           <a:p>
             <a:fld id="{6A60D253-495A-493B-97BB-B92F1FA596BA}" type="slidenum">
               <a:rPr lang="fr-CH" smtClean="0"/>
-              <a:t>‹N°›</a:t>
+              <a:t>‹#›</a:t>
             </a:fld>
             <a:endParaRPr lang="fr-CH"/>
           </a:p>
@@ -719,7 +719,7 @@
     </p:spTree>
     <p:extLst>
       <p:ext uri="{BB962C8B-B14F-4D97-AF65-F5344CB8AC3E}">
-        <p14:creationId xmlns:p14="http://schemas.microsoft.com/office/powerpoint/2010/main" val="4014321481"/>
+        <p14:creationId xmlns:p14="http://schemas.microsoft.com/office/powerpoint/2010/main" val="2817228891"/>
       </p:ext>
     </p:extLst>
   </p:cSld>
@@ -803,7 +803,7 @@
     </p:spTree>
     <p:extLst>
       <p:ext uri="{BB962C8B-B14F-4D97-AF65-F5344CB8AC3E}">
-        <p14:creationId xmlns:p14="http://schemas.microsoft.com/office/powerpoint/2010/main" val="2187747136"/>
+        <p14:creationId xmlns:p14="http://schemas.microsoft.com/office/powerpoint/2010/main" val="2817228891"/>
       </p:ext>
     </p:extLst>
   </p:cSld>
@@ -1761,7 +1761,7 @@
             <a:fld id="{B61BEF0D-F0BB-DE4B-95CE-6DB70DBA9567}" type="datetimeFigureOut">
               <a:rPr lang="en-US" smtClean="0"/>
               <a:pPr/>
-              <a:t>1/5/2014</a:t>
+              <a:t>05.01.14</a:t>
             </a:fld>
             <a:endParaRPr lang="en-US" dirty="0"/>
           </a:p>
@@ -1804,7 +1804,7 @@
             <a:fld id="{D57F1E4F-1CFF-5643-939E-217C01CDF565}" type="slidenum">
               <a:rPr lang="en-US" smtClean="0"/>
               <a:pPr/>
-              <a:t>‹N°›</a:t>
+              <a:t>‹#›</a:t>
             </a:fld>
             <a:endParaRPr lang="en-US" dirty="0"/>
           </a:p>
@@ -2199,7 +2199,7 @@
             <a:fld id="{B61BEF0D-F0BB-DE4B-95CE-6DB70DBA9567}" type="datetimeFigureOut">
               <a:rPr lang="en-US" smtClean="0"/>
               <a:pPr/>
-              <a:t>1/5/2014</a:t>
+              <a:t>05.01.14</a:t>
             </a:fld>
             <a:endParaRPr lang="en-US" dirty="0"/>
           </a:p>
@@ -2242,7 +2242,7 @@
             <a:fld id="{D57F1E4F-1CFF-5643-939E-217C01CDF565}" type="slidenum">
               <a:rPr lang="en-US" smtClean="0"/>
               <a:pPr/>
-              <a:t>‹N°›</a:t>
+              <a:t>‹#›</a:t>
             </a:fld>
             <a:endParaRPr lang="en-US" dirty="0"/>
           </a:p>
@@ -2451,7 +2451,7 @@
             <a:fld id="{B61BEF0D-F0BB-DE4B-95CE-6DB70DBA9567}" type="datetimeFigureOut">
               <a:rPr lang="en-US" smtClean="0"/>
               <a:pPr/>
-              <a:t>1/5/2014</a:t>
+              <a:t>05.01.14</a:t>
             </a:fld>
             <a:endParaRPr lang="en-US" dirty="0"/>
           </a:p>
@@ -2494,7 +2494,7 @@
             <a:fld id="{D57F1E4F-1CFF-5643-939E-217C01CDF565}" type="slidenum">
               <a:rPr lang="en-US" smtClean="0"/>
               <a:pPr/>
-              <a:t>‹N°›</a:t>
+              <a:t>‹#›</a:t>
             </a:fld>
             <a:endParaRPr lang="en-US" dirty="0"/>
           </a:p>
@@ -2761,7 +2761,7 @@
             <a:fld id="{B61BEF0D-F0BB-DE4B-95CE-6DB70DBA9567}" type="datetimeFigureOut">
               <a:rPr lang="en-US" smtClean="0"/>
               <a:pPr/>
-              <a:t>1/5/2014</a:t>
+              <a:t>05.01.14</a:t>
             </a:fld>
             <a:endParaRPr lang="en-US" dirty="0"/>
           </a:p>
@@ -2804,7 +2804,7 @@
             <a:fld id="{D57F1E4F-1CFF-5643-939E-217C01CDF565}" type="slidenum">
               <a:rPr lang="en-US" smtClean="0"/>
               <a:pPr/>
-              <a:t>‹N°›</a:t>
+              <a:t>‹#›</a:t>
             </a:fld>
             <a:endParaRPr lang="en-US" dirty="0"/>
           </a:p>
@@ -3081,7 +3081,7 @@
             <a:fld id="{B61BEF0D-F0BB-DE4B-95CE-6DB70DBA9567}" type="datetimeFigureOut">
               <a:rPr lang="en-US" smtClean="0"/>
               <a:pPr/>
-              <a:t>1/5/2014</a:t>
+              <a:t>05.01.14</a:t>
             </a:fld>
             <a:endParaRPr lang="en-US" dirty="0"/>
           </a:p>
@@ -3124,7 +3124,7 @@
             <a:fld id="{D57F1E4F-1CFF-5643-939E-217C01CDF565}" type="slidenum">
               <a:rPr lang="en-US" smtClean="0"/>
               <a:pPr/>
-              <a:t>‹N°›</a:t>
+              <a:t>‹#›</a:t>
             </a:fld>
             <a:endParaRPr lang="en-US" dirty="0"/>
           </a:p>
@@ -3385,7 +3385,7 @@
             <a:fld id="{B61BEF0D-F0BB-DE4B-95CE-6DB70DBA9567}" type="datetimeFigureOut">
               <a:rPr lang="en-US" smtClean="0"/>
               <a:pPr/>
-              <a:t>1/5/2014</a:t>
+              <a:t>05.01.14</a:t>
             </a:fld>
             <a:endParaRPr lang="en-US" dirty="0"/>
           </a:p>
@@ -3428,7 +3428,7 @@
             <a:fld id="{D57F1E4F-1CFF-5643-939E-217C01CDF565}" type="slidenum">
               <a:rPr lang="en-US" smtClean="0"/>
               <a:pPr/>
-              <a:t>‹N°›</a:t>
+              <a:t>‹#›</a:t>
             </a:fld>
             <a:endParaRPr lang="en-US" dirty="0"/>
           </a:p>
@@ -3754,7 +3754,7 @@
             <a:fld id="{B61BEF0D-F0BB-DE4B-95CE-6DB70DBA9567}" type="datetimeFigureOut">
               <a:rPr lang="en-US" smtClean="0"/>
               <a:pPr/>
-              <a:t>1/5/2014</a:t>
+              <a:t>05.01.14</a:t>
             </a:fld>
             <a:endParaRPr lang="en-US" dirty="0"/>
           </a:p>
@@ -3797,7 +3797,7 @@
             <a:fld id="{D57F1E4F-1CFF-5643-939E-217C01CDF565}" type="slidenum">
               <a:rPr lang="en-US" smtClean="0"/>
               <a:pPr/>
-              <a:t>‹N°›</a:t>
+              <a:t>‹#›</a:t>
             </a:fld>
             <a:endParaRPr lang="en-US" dirty="0"/>
           </a:p>
@@ -3930,7 +3930,7 @@
             <a:fld id="{B61BEF0D-F0BB-DE4B-95CE-6DB70DBA9567}" type="datetimeFigureOut">
               <a:rPr lang="en-US" smtClean="0"/>
               <a:pPr/>
-              <a:t>1/5/2014</a:t>
+              <a:t>05.01.14</a:t>
             </a:fld>
             <a:endParaRPr lang="en-US" dirty="0"/>
           </a:p>
@@ -3973,7 +3973,7 @@
             <a:fld id="{D57F1E4F-1CFF-5643-939E-217C01CDF565}" type="slidenum">
               <a:rPr lang="en-US" smtClean="0"/>
               <a:pPr/>
-              <a:t>‹N°›</a:t>
+              <a:t>‹#›</a:t>
             </a:fld>
             <a:endParaRPr lang="en-US" dirty="0"/>
           </a:p>
@@ -4112,7 +4112,7 @@
             <a:fld id="{B61BEF0D-F0BB-DE4B-95CE-6DB70DBA9567}" type="datetimeFigureOut">
               <a:rPr lang="en-US" smtClean="0"/>
               <a:pPr/>
-              <a:t>1/5/2014</a:t>
+              <a:t>05.01.14</a:t>
             </a:fld>
             <a:endParaRPr lang="en-US" dirty="0"/>
           </a:p>
@@ -4155,7 +4155,7 @@
             <a:fld id="{D57F1E4F-1CFF-5643-939E-217C01CDF565}" type="slidenum">
               <a:rPr lang="en-US" smtClean="0"/>
               <a:pPr/>
-              <a:t>‹N°›</a:t>
+              <a:t>‹#›</a:t>
             </a:fld>
             <a:endParaRPr lang="en-US" dirty="0"/>
           </a:p>
@@ -4284,7 +4284,7 @@
             <a:fld id="{B61BEF0D-F0BB-DE4B-95CE-6DB70DBA9567}" type="datetimeFigureOut">
               <a:rPr lang="en-US" smtClean="0"/>
               <a:pPr/>
-              <a:t>1/5/2014</a:t>
+              <a:t>05.01.14</a:t>
             </a:fld>
             <a:endParaRPr lang="en-US" dirty="0"/>
           </a:p>
@@ -4327,7 +4327,7 @@
             <a:fld id="{D57F1E4F-1CFF-5643-939E-217C01CDF565}" type="slidenum">
               <a:rPr lang="en-US" smtClean="0"/>
               <a:pPr/>
-              <a:t>‹N°›</a:t>
+              <a:t>‹#›</a:t>
             </a:fld>
             <a:endParaRPr lang="en-US" dirty="0"/>
           </a:p>
@@ -4536,7 +4536,7 @@
             <a:fld id="{B61BEF0D-F0BB-DE4B-95CE-6DB70DBA9567}" type="datetimeFigureOut">
               <a:rPr lang="en-US" smtClean="0"/>
               <a:pPr/>
-              <a:t>1/5/2014</a:t>
+              <a:t>05.01.14</a:t>
             </a:fld>
             <a:endParaRPr lang="en-US" dirty="0"/>
           </a:p>
@@ -4579,7 +4579,7 @@
             <a:fld id="{D57F1E4F-1CFF-5643-939E-217C01CDF565}" type="slidenum">
               <a:rPr lang="en-US" smtClean="0"/>
               <a:pPr/>
-              <a:t>‹N°›</a:t>
+              <a:t>‹#›</a:t>
             </a:fld>
             <a:endParaRPr lang="en-US" dirty="0"/>
           </a:p>
@@ -4774,7 +4774,7 @@
             <a:fld id="{B61BEF0D-F0BB-DE4B-95CE-6DB70DBA9567}" type="datetimeFigureOut">
               <a:rPr lang="en-US" smtClean="0"/>
               <a:pPr/>
-              <a:t>1/5/2014</a:t>
+              <a:t>05.01.14</a:t>
             </a:fld>
             <a:endParaRPr lang="en-US" dirty="0"/>
           </a:p>
@@ -4817,7 +4817,7 @@
             <a:fld id="{D57F1E4F-1CFF-5643-939E-217C01CDF565}" type="slidenum">
               <a:rPr lang="en-US" smtClean="0"/>
               <a:pPr/>
-              <a:t>‹N°›</a:t>
+              <a:t>‹#›</a:t>
             </a:fld>
             <a:endParaRPr lang="en-US" dirty="0"/>
           </a:p>
@@ -5158,7 +5158,7 @@
             <a:fld id="{B61BEF0D-F0BB-DE4B-95CE-6DB70DBA9567}" type="datetimeFigureOut">
               <a:rPr lang="en-US" smtClean="0"/>
               <a:pPr/>
-              <a:t>1/5/2014</a:t>
+              <a:t>05.01.14</a:t>
             </a:fld>
             <a:endParaRPr lang="en-US" dirty="0"/>
           </a:p>
@@ -5201,7 +5201,7 @@
             <a:fld id="{D57F1E4F-1CFF-5643-939E-217C01CDF565}" type="slidenum">
               <a:rPr lang="en-US" smtClean="0"/>
               <a:pPr/>
-              <a:t>‹N°›</a:t>
+              <a:t>‹#›</a:t>
             </a:fld>
             <a:endParaRPr lang="en-US" dirty="0"/>
           </a:p>
@@ -5278,7 +5278,7 @@
             <a:fld id="{B61BEF0D-F0BB-DE4B-95CE-6DB70DBA9567}" type="datetimeFigureOut">
               <a:rPr lang="en-US" smtClean="0"/>
               <a:pPr/>
-              <a:t>1/5/2014</a:t>
+              <a:t>05.01.14</a:t>
             </a:fld>
             <a:endParaRPr lang="en-US" dirty="0"/>
           </a:p>
@@ -5321,7 +5321,7 @@
             <a:fld id="{D57F1E4F-1CFF-5643-939E-217C01CDF565}" type="slidenum">
               <a:rPr lang="en-US" smtClean="0"/>
               <a:pPr/>
-              <a:t>‹N°›</a:t>
+              <a:t>‹#›</a:t>
             </a:fld>
             <a:endParaRPr lang="en-US" dirty="0"/>
           </a:p>
@@ -5375,7 +5375,7 @@
             <a:fld id="{B61BEF0D-F0BB-DE4B-95CE-6DB70DBA9567}" type="datetimeFigureOut">
               <a:rPr lang="en-US" smtClean="0"/>
               <a:pPr/>
-              <a:t>1/5/2014</a:t>
+              <a:t>05.01.14</a:t>
             </a:fld>
             <a:endParaRPr lang="en-US" dirty="0"/>
           </a:p>
@@ -5418,7 +5418,7 @@
             <a:fld id="{D57F1E4F-1CFF-5643-939E-217C01CDF565}" type="slidenum">
               <a:rPr lang="en-US" smtClean="0"/>
               <a:pPr/>
-              <a:t>‹N°›</a:t>
+              <a:t>‹#›</a:t>
             </a:fld>
             <a:endParaRPr lang="en-US" dirty="0"/>
           </a:p>
@@ -5632,7 +5632,7 @@
             <a:fld id="{B61BEF0D-F0BB-DE4B-95CE-6DB70DBA9567}" type="datetimeFigureOut">
               <a:rPr lang="en-US" smtClean="0"/>
               <a:pPr/>
-              <a:t>1/5/2014</a:t>
+              <a:t>05.01.14</a:t>
             </a:fld>
             <a:endParaRPr lang="en-US" dirty="0"/>
           </a:p>
@@ -5675,7 +5675,7 @@
             <a:fld id="{D57F1E4F-1CFF-5643-939E-217C01CDF565}" type="slidenum">
               <a:rPr lang="en-US" smtClean="0"/>
               <a:pPr/>
-              <a:t>‹N°›</a:t>
+              <a:t>‹#›</a:t>
             </a:fld>
             <a:endParaRPr lang="en-US" dirty="0"/>
           </a:p>
@@ -5917,7 +5917,7 @@
             <a:fld id="{B61BEF0D-F0BB-DE4B-95CE-6DB70DBA9567}" type="datetimeFigureOut">
               <a:rPr lang="en-US" smtClean="0"/>
               <a:pPr/>
-              <a:t>1/5/2014</a:t>
+              <a:t>05.01.14</a:t>
             </a:fld>
             <a:endParaRPr lang="en-US" dirty="0"/>
           </a:p>
@@ -5960,7 +5960,7 @@
             <a:fld id="{D57F1E4F-1CFF-5643-939E-217C01CDF565}" type="slidenum">
               <a:rPr lang="en-US" smtClean="0"/>
               <a:pPr/>
-              <a:t>‹N°›</a:t>
+              <a:t>‹#›</a:t>
             </a:fld>
             <a:endParaRPr lang="en-US" dirty="0"/>
           </a:p>
@@ -6325,7 +6325,7 @@
             <a:fld id="{B61BEF0D-F0BB-DE4B-95CE-6DB70DBA9567}" type="datetimeFigureOut">
               <a:rPr lang="en-US" smtClean="0"/>
               <a:pPr/>
-              <a:t>1/5/2014</a:t>
+              <a:t>05.01.14</a:t>
             </a:fld>
             <a:endParaRPr lang="en-US" dirty="0"/>
           </a:p>
@@ -6408,7 +6408,7 @@
             <a:fld id="{D57F1E4F-1CFF-5643-939E-217C01CDF565}" type="slidenum">
               <a:rPr lang="en-US" smtClean="0"/>
               <a:pPr/>
-              <a:t>‹N°›</a:t>
+              <a:t>‹#›</a:t>
             </a:fld>
             <a:endParaRPr lang="en-US" dirty="0"/>
           </a:p>
@@ -7144,7 +7144,7 @@
           </a:prstGeom>
           <a:noFill/>
           <a:extLst>
-            <a:ext uri="{909E8E84-426E-40DD-AFC4-6F175D3DCCD1}">
+            <a:ext uri="{909E8E84-426E-40dd-AFC4-6F175D3DCCD1}">
               <a14:hiddenFill xmlns:a14="http://schemas.microsoft.com/office/drawing/2010/main">
                 <a:solidFill>
                   <a:srgbClr val="FFFFFF"/>
@@ -7167,7 +7167,7 @@
   <p:timing>
     <p:tnLst>
       <p:par>
-        <p:cTn id="1" dur="indefinite" restart="never" nodeType="tmRoot"/>
+        <p:cTn xmlns:p14="http://schemas.microsoft.com/office/powerpoint/2010/main" id="1" dur="indefinite" restart="never" nodeType="tmRoot"/>
       </p:par>
     </p:tnLst>
   </p:timing>
@@ -7204,7 +7204,7 @@
         <p:spPr>
           <a:xfrm>
             <a:off x="684212" y="685801"/>
-            <a:ext cx="8534400" cy="1993900"/>
+            <a:ext cx="8534400" cy="599140"/>
           </a:xfrm>
         </p:spPr>
         <p:txBody>
@@ -7222,12 +7222,12 @@
               <a:t>Résultat </a:t>
             </a:r>
             <a:r>
-              <a:rPr lang="fr-CH" sz="2800" dirty="0" err="1" smtClean="0">
+              <a:rPr lang="fr-CH" sz="2800" dirty="0" smtClean="0">
                 <a:solidFill>
                   <a:schemeClr val="tx1"/>
                 </a:solidFill>
               </a:rPr>
-              <a:t>benchmarking</a:t>
+              <a:t>benchmarking (10 threads)</a:t>
             </a:r>
             <a:endParaRPr lang="fr-CH" sz="2800" dirty="0" smtClean="0">
               <a:solidFill>
@@ -7261,6 +7261,552 @@
           </a:p>
         </p:txBody>
       </p:sp>
+      <p:graphicFrame>
+        <p:nvGraphicFramePr>
+          <p:cNvPr id="4" name="Tableau 3"/>
+          <p:cNvGraphicFramePr>
+            <a:graphicFrameLocks noGrp="1"/>
+          </p:cNvGraphicFramePr>
+          <p:nvPr>
+            <p:extLst>
+              <p:ext uri="{D42A27DB-BD31-4B8C-83A1-F6EECF244321}">
+                <p14:modId xmlns:p14="http://schemas.microsoft.com/office/powerpoint/2010/main" val="3891223343"/>
+              </p:ext>
+            </p:extLst>
+          </p:nvPr>
+        </p:nvGraphicFramePr>
+        <p:xfrm>
+          <a:off x="597650" y="1511544"/>
+          <a:ext cx="10189880" cy="4659160"/>
+        </p:xfrm>
+        <a:graphic>
+          <a:graphicData uri="http://schemas.openxmlformats.org/drawingml/2006/table">
+            <a:tbl>
+              <a:tblPr firstRow="1" bandRow="1">
+                <a:tableStyleId>{3B4B98B0-60AC-42C2-AFA5-B58CD77FA1E5}</a:tableStyleId>
+              </a:tblPr>
+              <a:tblGrid>
+                <a:gridCol w="2037976"/>
+                <a:gridCol w="2037976"/>
+                <a:gridCol w="2037976"/>
+                <a:gridCol w="2037976"/>
+                <a:gridCol w="2037976"/>
+              </a:tblGrid>
+              <a:tr h="760864">
+                <a:tc>
+                  <a:txBody>
+                    <a:bodyPr/>
+                    <a:lstStyle/>
+                    <a:p>
+                      <a:r>
+                        <a:rPr lang="fr-FR" sz="2000" dirty="0" smtClean="0"/>
+                        <a:t>Opération</a:t>
+                      </a:r>
+                      <a:endParaRPr lang="fr-FR" sz="2000" dirty="0"/>
+                    </a:p>
+                  </a:txBody>
+                  <a:tcPr/>
+                </a:tc>
+                <a:tc>
+                  <a:txBody>
+                    <a:bodyPr/>
+                    <a:lstStyle/>
+                    <a:p>
+                      <a:r>
+                        <a:rPr lang="fr-FR" sz="2000" dirty="0" smtClean="0"/>
+                        <a:t>One server</a:t>
+                      </a:r>
+                      <a:endParaRPr lang="fr-FR" sz="2000" dirty="0"/>
+                    </a:p>
+                  </a:txBody>
+                  <a:tcPr/>
+                </a:tc>
+                <a:tc>
+                  <a:txBody>
+                    <a:bodyPr/>
+                    <a:lstStyle/>
+                    <a:p>
+                      <a:r>
+                        <a:rPr lang="fr-FR" sz="2000" dirty="0" smtClean="0"/>
+                        <a:t>Cluster</a:t>
+                      </a:r>
+                      <a:endParaRPr lang="fr-FR" sz="2000" dirty="0"/>
+                    </a:p>
+                  </a:txBody>
+                  <a:tcPr/>
+                </a:tc>
+                <a:tc>
+                  <a:txBody>
+                    <a:bodyPr/>
+                    <a:lstStyle/>
+                    <a:p>
+                      <a:r>
+                        <a:rPr lang="fr-FR" sz="2000" dirty="0" smtClean="0"/>
+                        <a:t>One</a:t>
+                      </a:r>
+                      <a:r>
+                        <a:rPr lang="fr-FR" sz="2000" baseline="0" dirty="0" smtClean="0"/>
+                        <a:t> server + cache</a:t>
+                      </a:r>
+                      <a:endParaRPr lang="fr-FR" sz="2000" dirty="0"/>
+                    </a:p>
+                  </a:txBody>
+                  <a:tcPr/>
+                </a:tc>
+                <a:tc>
+                  <a:txBody>
+                    <a:bodyPr/>
+                    <a:lstStyle/>
+                    <a:p>
+                      <a:r>
+                        <a:rPr lang="fr-FR" sz="2000" dirty="0" smtClean="0"/>
+                        <a:t>Cluster</a:t>
+                      </a:r>
+                      <a:r>
+                        <a:rPr lang="fr-FR" sz="2000" baseline="0" dirty="0" smtClean="0"/>
+                        <a:t> + cache</a:t>
+                      </a:r>
+                      <a:endParaRPr lang="fr-FR" sz="2000" dirty="0"/>
+                    </a:p>
+                  </a:txBody>
+                  <a:tcPr/>
+                </a:tc>
+              </a:tr>
+              <a:tr h="649716">
+                <a:tc>
+                  <a:txBody>
+                    <a:bodyPr/>
+                    <a:lstStyle/>
+                    <a:p>
+                      <a:r>
+                        <a:rPr lang="fr-FR" sz="2000" dirty="0" smtClean="0"/>
+                        <a:t>POST</a:t>
+                      </a:r>
+                      <a:endParaRPr lang="fr-FR" sz="2000" dirty="0"/>
+                    </a:p>
+                  </a:txBody>
+                  <a:tcPr/>
+                </a:tc>
+                <a:tc>
+                  <a:txBody>
+                    <a:bodyPr/>
+                    <a:lstStyle/>
+                    <a:p>
+                      <a:r>
+                        <a:rPr lang="fr-FR" sz="2000" dirty="0" smtClean="0"/>
+                        <a:t>12</a:t>
+                      </a:r>
+                    </a:p>
+                  </a:txBody>
+                  <a:tcPr/>
+                </a:tc>
+                <a:tc>
+                  <a:txBody>
+                    <a:bodyPr/>
+                    <a:lstStyle/>
+                    <a:p>
+                      <a:r>
+                        <a:rPr lang="fr-FR" sz="2000" dirty="0" smtClean="0"/>
+                        <a:t>10</a:t>
+                      </a:r>
+                      <a:endParaRPr lang="fr-FR" sz="2000" dirty="0"/>
+                    </a:p>
+                  </a:txBody>
+                  <a:tcPr/>
+                </a:tc>
+                <a:tc>
+                  <a:txBody>
+                    <a:bodyPr/>
+                    <a:lstStyle/>
+                    <a:p>
+                      <a:r>
+                        <a:rPr lang="fr-FR" sz="2000" dirty="0" smtClean="0"/>
+                        <a:t>10</a:t>
+                      </a:r>
+                      <a:endParaRPr lang="fr-FR" sz="2000" dirty="0"/>
+                    </a:p>
+                  </a:txBody>
+                  <a:tcPr/>
+                </a:tc>
+                <a:tc>
+                  <a:txBody>
+                    <a:bodyPr/>
+                    <a:lstStyle/>
+                    <a:p>
+                      <a:r>
+                        <a:rPr lang="fr-FR" sz="2000" dirty="0" smtClean="0"/>
+                        <a:t>11</a:t>
+                      </a:r>
+                      <a:endParaRPr lang="fr-FR" sz="2000" dirty="0"/>
+                    </a:p>
+                  </a:txBody>
+                  <a:tcPr/>
+                </a:tc>
+              </a:tr>
+              <a:tr h="649716">
+                <a:tc>
+                  <a:txBody>
+                    <a:bodyPr/>
+                    <a:lstStyle/>
+                    <a:p>
+                      <a:r>
+                        <a:rPr lang="fr-FR" sz="2000" dirty="0" smtClean="0"/>
+                        <a:t>PUT</a:t>
+                      </a:r>
+                      <a:endParaRPr lang="fr-FR" sz="2000" dirty="0"/>
+                    </a:p>
+                  </a:txBody>
+                  <a:tcPr/>
+                </a:tc>
+                <a:tc>
+                  <a:txBody>
+                    <a:bodyPr/>
+                    <a:lstStyle/>
+                    <a:p>
+                      <a:r>
+                        <a:rPr lang="fr-FR" sz="2000" dirty="0" smtClean="0"/>
+                        <a:t>13</a:t>
+                      </a:r>
+                      <a:endParaRPr lang="fr-FR" sz="2000" dirty="0"/>
+                    </a:p>
+                  </a:txBody>
+                  <a:tcPr/>
+                </a:tc>
+                <a:tc>
+                  <a:txBody>
+                    <a:bodyPr/>
+                    <a:lstStyle/>
+                    <a:p>
+                      <a:r>
+                        <a:rPr lang="fr-FR" sz="2000" dirty="0" smtClean="0"/>
+                        <a:t>11</a:t>
+                      </a:r>
+                      <a:endParaRPr lang="fr-FR" sz="2000" dirty="0"/>
+                    </a:p>
+                  </a:txBody>
+                  <a:tcPr/>
+                </a:tc>
+                <a:tc>
+                  <a:txBody>
+                    <a:bodyPr/>
+                    <a:lstStyle/>
+                    <a:p>
+                      <a:r>
+                        <a:rPr lang="fr-FR" sz="2000" dirty="0" smtClean="0"/>
+                        <a:t>11</a:t>
+                      </a:r>
+                      <a:endParaRPr lang="fr-FR" sz="2000" dirty="0"/>
+                    </a:p>
+                  </a:txBody>
+                  <a:tcPr/>
+                </a:tc>
+                <a:tc>
+                  <a:txBody>
+                    <a:bodyPr/>
+                    <a:lstStyle/>
+                    <a:p>
+                      <a:r>
+                        <a:rPr lang="fr-FR" sz="2000" dirty="0" smtClean="0"/>
+                        <a:t>12</a:t>
+                      </a:r>
+                      <a:endParaRPr lang="fr-FR" sz="2000" dirty="0"/>
+                    </a:p>
+                  </a:txBody>
+                  <a:tcPr/>
+                </a:tc>
+              </a:tr>
+              <a:tr h="649716">
+                <a:tc>
+                  <a:txBody>
+                    <a:bodyPr/>
+                    <a:lstStyle/>
+                    <a:p>
+                      <a:r>
+                        <a:rPr lang="fr-FR" sz="2000" dirty="0" smtClean="0"/>
+                        <a:t>GET (ONE)</a:t>
+                      </a:r>
+                      <a:endParaRPr lang="fr-FR" sz="2000" dirty="0"/>
+                    </a:p>
+                  </a:txBody>
+                  <a:tcPr/>
+                </a:tc>
+                <a:tc>
+                  <a:txBody>
+                    <a:bodyPr/>
+                    <a:lstStyle/>
+                    <a:p>
+                      <a:r>
+                        <a:rPr lang="fr-FR" sz="2000" dirty="0" smtClean="0"/>
+                        <a:t>14</a:t>
+                      </a:r>
+                      <a:endParaRPr lang="fr-FR" sz="2000" dirty="0"/>
+                    </a:p>
+                  </a:txBody>
+                  <a:tcPr/>
+                </a:tc>
+                <a:tc>
+                  <a:txBody>
+                    <a:bodyPr/>
+                    <a:lstStyle/>
+                    <a:p>
+                      <a:r>
+                        <a:rPr lang="fr-FR" sz="2000" dirty="0" smtClean="0"/>
+                        <a:t>12</a:t>
+                      </a:r>
+                      <a:endParaRPr lang="fr-FR" sz="2000" dirty="0"/>
+                    </a:p>
+                  </a:txBody>
+                  <a:tcPr/>
+                </a:tc>
+                <a:tc>
+                  <a:txBody>
+                    <a:bodyPr/>
+                    <a:lstStyle/>
+                    <a:p>
+                      <a:r>
+                        <a:rPr lang="fr-FR" sz="2000" dirty="0" smtClean="0"/>
+                        <a:t>6</a:t>
+                      </a:r>
+                      <a:endParaRPr lang="fr-FR" sz="2000" dirty="0"/>
+                    </a:p>
+                  </a:txBody>
+                  <a:tcPr/>
+                </a:tc>
+                <a:tc>
+                  <a:txBody>
+                    <a:bodyPr/>
+                    <a:lstStyle/>
+                    <a:p>
+                      <a:r>
+                        <a:rPr lang="fr-FR" sz="2000" dirty="0" smtClean="0"/>
+                        <a:t>5</a:t>
+                      </a:r>
+                      <a:endParaRPr lang="fr-FR" sz="2000" dirty="0"/>
+                    </a:p>
+                  </a:txBody>
+                  <a:tcPr/>
+                </a:tc>
+              </a:tr>
+              <a:tr h="649716">
+                <a:tc>
+                  <a:txBody>
+                    <a:bodyPr/>
+                    <a:lstStyle/>
+                    <a:p>
+                      <a:r>
+                        <a:rPr lang="fr-FR" sz="2000" dirty="0" smtClean="0"/>
+                        <a:t>GET (ALL)</a:t>
+                      </a:r>
+                      <a:endParaRPr lang="fr-FR" sz="2000" dirty="0"/>
+                    </a:p>
+                  </a:txBody>
+                  <a:tcPr/>
+                </a:tc>
+                <a:tc>
+                  <a:txBody>
+                    <a:bodyPr/>
+                    <a:lstStyle/>
+                    <a:p>
+                      <a:r>
+                        <a:rPr lang="fr-FR" sz="2000" dirty="0" smtClean="0"/>
+                        <a:t>94</a:t>
+                      </a:r>
+                      <a:endParaRPr lang="fr-FR" sz="2000" dirty="0"/>
+                    </a:p>
+                  </a:txBody>
+                  <a:tcPr/>
+                </a:tc>
+                <a:tc>
+                  <a:txBody>
+                    <a:bodyPr/>
+                    <a:lstStyle/>
+                    <a:p>
+                      <a:r>
+                        <a:rPr lang="fr-FR" sz="2000" dirty="0" smtClean="0"/>
+                        <a:t>96</a:t>
+                      </a:r>
+                      <a:endParaRPr lang="fr-FR" sz="2000" dirty="0"/>
+                    </a:p>
+                  </a:txBody>
+                  <a:tcPr/>
+                </a:tc>
+                <a:tc>
+                  <a:txBody>
+                    <a:bodyPr/>
+                    <a:lstStyle/>
+                    <a:p>
+                      <a:r>
+                        <a:rPr lang="fr-FR" sz="2000" dirty="0" smtClean="0"/>
+                        <a:t>54</a:t>
+                      </a:r>
+                      <a:endParaRPr lang="fr-FR" sz="2000" dirty="0"/>
+                    </a:p>
+                  </a:txBody>
+                  <a:tcPr/>
+                </a:tc>
+                <a:tc>
+                  <a:txBody>
+                    <a:bodyPr/>
+                    <a:lstStyle/>
+                    <a:p>
+                      <a:r>
+                        <a:rPr lang="fr-FR" sz="2000" dirty="0" smtClean="0"/>
+                        <a:t>60</a:t>
+                      </a:r>
+                      <a:endParaRPr lang="fr-FR" sz="2000" dirty="0"/>
+                    </a:p>
+                  </a:txBody>
+                  <a:tcPr/>
+                </a:tc>
+              </a:tr>
+              <a:tr h="649716">
+                <a:tc>
+                  <a:txBody>
+                    <a:bodyPr/>
+                    <a:lstStyle/>
+                    <a:p>
+                      <a:r>
+                        <a:rPr lang="fr-FR" sz="2000" dirty="0" smtClean="0"/>
+                        <a:t>DELETE</a:t>
+                      </a:r>
+                      <a:endParaRPr lang="fr-FR" sz="2000" dirty="0"/>
+                    </a:p>
+                  </a:txBody>
+                  <a:tcPr/>
+                </a:tc>
+                <a:tc>
+                  <a:txBody>
+                    <a:bodyPr/>
+                    <a:lstStyle/>
+                    <a:p>
+                      <a:r>
+                        <a:rPr lang="fr-FR" sz="2000" dirty="0" smtClean="0"/>
+                        <a:t>10</a:t>
+                      </a:r>
+                      <a:endParaRPr lang="fr-FR" sz="2000" dirty="0"/>
+                    </a:p>
+                  </a:txBody>
+                  <a:tcPr/>
+                </a:tc>
+                <a:tc>
+                  <a:txBody>
+                    <a:bodyPr/>
+                    <a:lstStyle/>
+                    <a:p>
+                      <a:r>
+                        <a:rPr lang="fr-FR" sz="2000" dirty="0" smtClean="0"/>
+                        <a:t>9</a:t>
+                      </a:r>
+                      <a:endParaRPr lang="fr-FR" sz="2000" dirty="0"/>
+                    </a:p>
+                  </a:txBody>
+                  <a:tcPr/>
+                </a:tc>
+                <a:tc>
+                  <a:txBody>
+                    <a:bodyPr/>
+                    <a:lstStyle/>
+                    <a:p>
+                      <a:r>
+                        <a:rPr lang="fr-FR" sz="2000" dirty="0" smtClean="0"/>
+                        <a:t>11</a:t>
+                      </a:r>
+                      <a:endParaRPr lang="fr-FR" sz="2000" dirty="0"/>
+                    </a:p>
+                  </a:txBody>
+                  <a:tcPr/>
+                </a:tc>
+                <a:tc>
+                  <a:txBody>
+                    <a:bodyPr/>
+                    <a:lstStyle/>
+                    <a:p>
+                      <a:r>
+                        <a:rPr lang="fr-FR" sz="2000" dirty="0" smtClean="0"/>
+                        <a:t>10</a:t>
+                      </a:r>
+                      <a:endParaRPr lang="fr-FR" sz="2000" dirty="0"/>
+                    </a:p>
+                  </a:txBody>
+                  <a:tcPr/>
+                </a:tc>
+              </a:tr>
+              <a:tr h="649716">
+                <a:tc>
+                  <a:txBody>
+                    <a:bodyPr/>
+                    <a:lstStyle/>
+                    <a:p>
+                      <a:r>
+                        <a:rPr lang="fr-FR" sz="2000" b="1" dirty="0" smtClean="0"/>
+                        <a:t>TOTAL</a:t>
+                      </a:r>
+                      <a:endParaRPr lang="fr-FR" sz="2000" b="1" dirty="0"/>
+                    </a:p>
+                  </a:txBody>
+                  <a:tcPr/>
+                </a:tc>
+                <a:tc>
+                  <a:txBody>
+                    <a:bodyPr/>
+                    <a:lstStyle/>
+                    <a:p>
+                      <a:r>
+                        <a:rPr lang="fr-FR" sz="2000" b="1" dirty="0" smtClean="0"/>
+                        <a:t>44</a:t>
+                      </a:r>
+                      <a:endParaRPr lang="fr-FR" sz="2000" b="1" dirty="0"/>
+                    </a:p>
+                  </a:txBody>
+                  <a:tcPr/>
+                </a:tc>
+                <a:tc>
+                  <a:txBody>
+                    <a:bodyPr/>
+                    <a:lstStyle/>
+                    <a:p>
+                      <a:r>
+                        <a:rPr lang="fr-FR" sz="2000" b="1" dirty="0" smtClean="0"/>
+                        <a:t>44</a:t>
+                      </a:r>
+                      <a:endParaRPr lang="fr-FR" sz="2000" b="1" dirty="0"/>
+                    </a:p>
+                  </a:txBody>
+                  <a:tcPr/>
+                </a:tc>
+                <a:tc>
+                  <a:txBody>
+                    <a:bodyPr/>
+                    <a:lstStyle/>
+                    <a:p>
+                      <a:r>
+                        <a:rPr lang="fr-FR" sz="2000" b="1" dirty="0" smtClean="0"/>
+                        <a:t>25</a:t>
+                      </a:r>
+                      <a:endParaRPr lang="fr-FR" sz="2000" b="1" dirty="0"/>
+                    </a:p>
+                  </a:txBody>
+                  <a:tcPr/>
+                </a:tc>
+                <a:tc>
+                  <a:txBody>
+                    <a:bodyPr/>
+                    <a:lstStyle/>
+                    <a:p>
+                      <a:r>
+                        <a:rPr lang="fr-FR" sz="2000" b="1" dirty="0" smtClean="0"/>
+                        <a:t>28</a:t>
+                      </a:r>
+                      <a:endParaRPr lang="fr-FR" sz="2000" b="1" dirty="0"/>
+                    </a:p>
+                  </a:txBody>
+                  <a:tcPr/>
+                </a:tc>
+              </a:tr>
+            </a:tbl>
+          </a:graphicData>
+        </a:graphic>
+      </p:graphicFrame>
     </p:spTree>
     <p:extLst>
       <p:ext uri="{BB962C8B-B14F-4D97-AF65-F5344CB8AC3E}">
@@ -7274,7 +7820,7 @@
   <p:timing>
     <p:tnLst>
       <p:par>
-        <p:cTn id="1" dur="indefinite" restart="never" nodeType="tmRoot"/>
+        <p:cTn xmlns:p14="http://schemas.microsoft.com/office/powerpoint/2010/main" id="1" dur="indefinite" restart="never" nodeType="tmRoot"/>
       </p:par>
     </p:tnLst>
   </p:timing>
@@ -7311,7 +7857,7 @@
         <p:spPr>
           <a:xfrm>
             <a:off x="684212" y="685801"/>
-            <a:ext cx="8534400" cy="1993900"/>
+            <a:ext cx="8534400" cy="599140"/>
           </a:xfrm>
         </p:spPr>
         <p:txBody>
@@ -7329,12 +7875,12 @@
               <a:t>Résultat </a:t>
             </a:r>
             <a:r>
-              <a:rPr lang="fr-CH" sz="2800" dirty="0" err="1" smtClean="0">
+              <a:rPr lang="fr-CH" sz="2800" dirty="0" smtClean="0">
                 <a:solidFill>
                   <a:schemeClr val="tx1"/>
                 </a:solidFill>
               </a:rPr>
-              <a:t>benchmarking</a:t>
+              <a:t>benchmarking (50 threads)</a:t>
             </a:r>
             <a:endParaRPr lang="fr-CH" sz="2800" dirty="0" smtClean="0">
               <a:solidFill>
@@ -7368,10 +7914,557 @@
           </a:p>
         </p:txBody>
       </p:sp>
+      <p:graphicFrame>
+        <p:nvGraphicFramePr>
+          <p:cNvPr id="4" name="Tableau 3"/>
+          <p:cNvGraphicFramePr>
+            <a:graphicFrameLocks noGrp="1"/>
+          </p:cNvGraphicFramePr>
+          <p:nvPr>
+            <p:extLst>
+              <p:ext uri="{D42A27DB-BD31-4B8C-83A1-F6EECF244321}">
+                <p14:modId xmlns:p14="http://schemas.microsoft.com/office/powerpoint/2010/main" val="2014508502"/>
+              </p:ext>
+            </p:extLst>
+          </p:nvPr>
+        </p:nvGraphicFramePr>
+        <p:xfrm>
+          <a:off x="597650" y="1511544"/>
+          <a:ext cx="10189880" cy="4659160"/>
+        </p:xfrm>
+        <a:graphic>
+          <a:graphicData uri="http://schemas.openxmlformats.org/drawingml/2006/table">
+            <a:tbl>
+              <a:tblPr firstRow="1" bandRow="1">
+                <a:tableStyleId>{3B4B98B0-60AC-42C2-AFA5-B58CD77FA1E5}</a:tableStyleId>
+              </a:tblPr>
+              <a:tblGrid>
+                <a:gridCol w="2037976"/>
+                <a:gridCol w="2037976"/>
+                <a:gridCol w="2037976"/>
+                <a:gridCol w="2037976"/>
+                <a:gridCol w="2037976"/>
+              </a:tblGrid>
+              <a:tr h="760864">
+                <a:tc>
+                  <a:txBody>
+                    <a:bodyPr/>
+                    <a:lstStyle/>
+                    <a:p>
+                      <a:r>
+                        <a:rPr lang="fr-FR" sz="2000" dirty="0" smtClean="0"/>
+                        <a:t>Opération</a:t>
+                      </a:r>
+                      <a:endParaRPr lang="fr-FR" sz="2000" dirty="0"/>
+                    </a:p>
+                  </a:txBody>
+                  <a:tcPr/>
+                </a:tc>
+                <a:tc>
+                  <a:txBody>
+                    <a:bodyPr/>
+                    <a:lstStyle/>
+                    <a:p>
+                      <a:r>
+                        <a:rPr lang="fr-FR" sz="2000" dirty="0" smtClean="0"/>
+                        <a:t>One server</a:t>
+                      </a:r>
+                      <a:endParaRPr lang="fr-FR" sz="2000" dirty="0"/>
+                    </a:p>
+                  </a:txBody>
+                  <a:tcPr/>
+                </a:tc>
+                <a:tc>
+                  <a:txBody>
+                    <a:bodyPr/>
+                    <a:lstStyle/>
+                    <a:p>
+                      <a:r>
+                        <a:rPr lang="fr-FR" sz="2000" dirty="0" smtClean="0"/>
+                        <a:t>Cluster</a:t>
+                      </a:r>
+                      <a:endParaRPr lang="fr-FR" sz="2000" dirty="0"/>
+                    </a:p>
+                  </a:txBody>
+                  <a:tcPr/>
+                </a:tc>
+                <a:tc>
+                  <a:txBody>
+                    <a:bodyPr/>
+                    <a:lstStyle/>
+                    <a:p>
+                      <a:r>
+                        <a:rPr lang="fr-FR" sz="2000" dirty="0" smtClean="0"/>
+                        <a:t>One</a:t>
+                      </a:r>
+                      <a:r>
+                        <a:rPr lang="fr-FR" sz="2000" baseline="0" dirty="0" smtClean="0"/>
+                        <a:t> server + cache</a:t>
+                      </a:r>
+                      <a:endParaRPr lang="fr-FR" sz="2000" dirty="0"/>
+                    </a:p>
+                  </a:txBody>
+                  <a:tcPr/>
+                </a:tc>
+                <a:tc>
+                  <a:txBody>
+                    <a:bodyPr/>
+                    <a:lstStyle/>
+                    <a:p>
+                      <a:r>
+                        <a:rPr lang="fr-FR" sz="2000" dirty="0" smtClean="0"/>
+                        <a:t>Cluster</a:t>
+                      </a:r>
+                      <a:r>
+                        <a:rPr lang="fr-FR" sz="2000" baseline="0" dirty="0" smtClean="0"/>
+                        <a:t> + cache</a:t>
+                      </a:r>
+                      <a:endParaRPr lang="fr-FR" sz="2000" dirty="0"/>
+                    </a:p>
+                  </a:txBody>
+                  <a:tcPr/>
+                </a:tc>
+              </a:tr>
+              <a:tr h="649716">
+                <a:tc>
+                  <a:txBody>
+                    <a:bodyPr/>
+                    <a:lstStyle/>
+                    <a:p>
+                      <a:r>
+                        <a:rPr lang="fr-FR" sz="2000" dirty="0" smtClean="0"/>
+                        <a:t>POST</a:t>
+                      </a:r>
+                      <a:endParaRPr lang="fr-FR" sz="2000" dirty="0"/>
+                    </a:p>
+                  </a:txBody>
+                  <a:tcPr/>
+                </a:tc>
+                <a:tc>
+                  <a:txBody>
+                    <a:bodyPr/>
+                    <a:lstStyle/>
+                    <a:p>
+                      <a:r>
+                        <a:rPr lang="fr-FR" sz="2000" dirty="0" smtClean="0"/>
+                        <a:t>213</a:t>
+                      </a:r>
+                      <a:endParaRPr lang="fr-FR" sz="2000" dirty="0"/>
+                    </a:p>
+                  </a:txBody>
+                  <a:tcPr/>
+                </a:tc>
+                <a:tc>
+                  <a:txBody>
+                    <a:bodyPr/>
+                    <a:lstStyle/>
+                    <a:p>
+                      <a:r>
+                        <a:rPr lang="fr-FR" sz="2000" dirty="0" smtClean="0"/>
+                        <a:t>152</a:t>
+                      </a:r>
+                      <a:endParaRPr lang="fr-FR" sz="2000" dirty="0"/>
+                    </a:p>
+                  </a:txBody>
+                  <a:tcPr/>
+                </a:tc>
+                <a:tc>
+                  <a:txBody>
+                    <a:bodyPr/>
+                    <a:lstStyle/>
+                    <a:p>
+                      <a:r>
+                        <a:rPr lang="fr-FR" sz="2000" dirty="0" smtClean="0"/>
+                        <a:t>117</a:t>
+                      </a:r>
+                      <a:endParaRPr lang="fr-FR" sz="2000" dirty="0"/>
+                    </a:p>
+                  </a:txBody>
+                  <a:tcPr/>
+                </a:tc>
+                <a:tc>
+                  <a:txBody>
+                    <a:bodyPr/>
+                    <a:lstStyle/>
+                    <a:p>
+                      <a:r>
+                        <a:rPr lang="fr-FR" sz="2000" dirty="0" smtClean="0"/>
+                        <a:t>94</a:t>
+                      </a:r>
+                      <a:endParaRPr lang="fr-FR" sz="2000" dirty="0"/>
+                    </a:p>
+                  </a:txBody>
+                  <a:tcPr/>
+                </a:tc>
+              </a:tr>
+              <a:tr h="649716">
+                <a:tc>
+                  <a:txBody>
+                    <a:bodyPr/>
+                    <a:lstStyle/>
+                    <a:p>
+                      <a:r>
+                        <a:rPr lang="fr-FR" sz="2000" dirty="0" smtClean="0"/>
+                        <a:t>PUT</a:t>
+                      </a:r>
+                      <a:endParaRPr lang="fr-FR" sz="2000" dirty="0"/>
+                    </a:p>
+                  </a:txBody>
+                  <a:tcPr/>
+                </a:tc>
+                <a:tc>
+                  <a:txBody>
+                    <a:bodyPr/>
+                    <a:lstStyle/>
+                    <a:p>
+                      <a:r>
+                        <a:rPr lang="fr-FR" sz="2000" dirty="0" smtClean="0"/>
+                        <a:t>193</a:t>
+                      </a:r>
+                      <a:endParaRPr lang="fr-FR" sz="2000" dirty="0"/>
+                    </a:p>
+                  </a:txBody>
+                  <a:tcPr/>
+                </a:tc>
+                <a:tc>
+                  <a:txBody>
+                    <a:bodyPr/>
+                    <a:lstStyle/>
+                    <a:p>
+                      <a:r>
+                        <a:rPr lang="fr-FR" sz="2000" dirty="0" smtClean="0"/>
+                        <a:t>151</a:t>
+                      </a:r>
+                      <a:endParaRPr lang="fr-FR" sz="2000" dirty="0"/>
+                    </a:p>
+                  </a:txBody>
+                  <a:tcPr/>
+                </a:tc>
+                <a:tc>
+                  <a:txBody>
+                    <a:bodyPr/>
+                    <a:lstStyle/>
+                    <a:p>
+                      <a:r>
+                        <a:rPr lang="fr-FR" sz="2000" dirty="0" smtClean="0"/>
+                        <a:t>117</a:t>
+                      </a:r>
+                      <a:endParaRPr lang="fr-FR" sz="2000" dirty="0"/>
+                    </a:p>
+                  </a:txBody>
+                  <a:tcPr/>
+                </a:tc>
+                <a:tc>
+                  <a:txBody>
+                    <a:bodyPr/>
+                    <a:lstStyle/>
+                    <a:p>
+                      <a:r>
+                        <a:rPr lang="fr-FR" sz="2000" dirty="0" smtClean="0"/>
+                        <a:t>84</a:t>
+                      </a:r>
+                      <a:endParaRPr lang="fr-FR" sz="2000" dirty="0"/>
+                    </a:p>
+                  </a:txBody>
+                  <a:tcPr/>
+                </a:tc>
+              </a:tr>
+              <a:tr h="649716">
+                <a:tc>
+                  <a:txBody>
+                    <a:bodyPr/>
+                    <a:lstStyle/>
+                    <a:p>
+                      <a:r>
+                        <a:rPr lang="fr-FR" sz="2000" dirty="0" smtClean="0"/>
+                        <a:t>GET (ONE)</a:t>
+                      </a:r>
+                      <a:endParaRPr lang="fr-FR" sz="2000" dirty="0"/>
+                    </a:p>
+                  </a:txBody>
+                  <a:tcPr/>
+                </a:tc>
+                <a:tc>
+                  <a:txBody>
+                    <a:bodyPr/>
+                    <a:lstStyle/>
+                    <a:p>
+                      <a:r>
+                        <a:rPr lang="fr-FR" sz="2000" dirty="0" smtClean="0"/>
+                        <a:t>208</a:t>
+                      </a:r>
+                      <a:endParaRPr lang="fr-FR" sz="2000" dirty="0"/>
+                    </a:p>
+                  </a:txBody>
+                  <a:tcPr/>
+                </a:tc>
+                <a:tc>
+                  <a:txBody>
+                    <a:bodyPr/>
+                    <a:lstStyle/>
+                    <a:p>
+                      <a:r>
+                        <a:rPr lang="fr-FR" sz="2000" dirty="0" smtClean="0"/>
+                        <a:t>159</a:t>
+                      </a:r>
+                      <a:endParaRPr lang="fr-FR" sz="2000" dirty="0"/>
+                    </a:p>
+                  </a:txBody>
+                  <a:tcPr/>
+                </a:tc>
+                <a:tc>
+                  <a:txBody>
+                    <a:bodyPr/>
+                    <a:lstStyle/>
+                    <a:p>
+                      <a:r>
+                        <a:rPr lang="fr-FR" sz="2000" dirty="0" smtClean="0"/>
+                        <a:t>119</a:t>
+                      </a:r>
+                      <a:endParaRPr lang="fr-FR" sz="2000" dirty="0"/>
+                    </a:p>
+                  </a:txBody>
+                  <a:tcPr/>
+                </a:tc>
+                <a:tc>
+                  <a:txBody>
+                    <a:bodyPr/>
+                    <a:lstStyle/>
+                    <a:p>
+                      <a:r>
+                        <a:rPr lang="fr-FR" sz="2000" dirty="0" smtClean="0"/>
+                        <a:t>84</a:t>
+                      </a:r>
+                      <a:endParaRPr lang="fr-FR" sz="2000" dirty="0"/>
+                    </a:p>
+                  </a:txBody>
+                  <a:tcPr/>
+                </a:tc>
+              </a:tr>
+              <a:tr h="649716">
+                <a:tc>
+                  <a:txBody>
+                    <a:bodyPr/>
+                    <a:lstStyle/>
+                    <a:p>
+                      <a:r>
+                        <a:rPr lang="fr-FR" sz="2000" dirty="0" smtClean="0"/>
+                        <a:t>GET (ALL)</a:t>
+                      </a:r>
+                      <a:endParaRPr lang="fr-FR" sz="2000" dirty="0"/>
+                    </a:p>
+                  </a:txBody>
+                  <a:tcPr/>
+                </a:tc>
+                <a:tc>
+                  <a:txBody>
+                    <a:bodyPr/>
+                    <a:lstStyle/>
+                    <a:p>
+                      <a:r>
+                        <a:rPr lang="fr-FR" sz="2000" dirty="0" smtClean="0"/>
+                        <a:t>274</a:t>
+                      </a:r>
+                      <a:endParaRPr lang="fr-FR" sz="2000" dirty="0"/>
+                    </a:p>
+                  </a:txBody>
+                  <a:tcPr/>
+                </a:tc>
+                <a:tc>
+                  <a:txBody>
+                    <a:bodyPr/>
+                    <a:lstStyle/>
+                    <a:p>
+                      <a:r>
+                        <a:rPr lang="fr-FR" sz="2000" dirty="0" smtClean="0"/>
+                        <a:t>267</a:t>
+                      </a:r>
+                      <a:endParaRPr lang="fr-FR" sz="2000" dirty="0"/>
+                    </a:p>
+                  </a:txBody>
+                  <a:tcPr/>
+                </a:tc>
+                <a:tc>
+                  <a:txBody>
+                    <a:bodyPr/>
+                    <a:lstStyle/>
+                    <a:p>
+                      <a:r>
+                        <a:rPr lang="fr-FR" sz="2000" dirty="0" smtClean="0"/>
+                        <a:t>168</a:t>
+                      </a:r>
+                      <a:endParaRPr lang="fr-FR" sz="2000" dirty="0"/>
+                    </a:p>
+                  </a:txBody>
+                  <a:tcPr/>
+                </a:tc>
+                <a:tc>
+                  <a:txBody>
+                    <a:bodyPr/>
+                    <a:lstStyle/>
+                    <a:p>
+                      <a:r>
+                        <a:rPr lang="fr-FR" sz="2000" dirty="0" smtClean="0"/>
+                        <a:t>160</a:t>
+                      </a:r>
+                      <a:endParaRPr lang="fr-FR" sz="2000" dirty="0"/>
+                    </a:p>
+                  </a:txBody>
+                  <a:tcPr/>
+                </a:tc>
+              </a:tr>
+              <a:tr h="649716">
+                <a:tc>
+                  <a:txBody>
+                    <a:bodyPr/>
+                    <a:lstStyle/>
+                    <a:p>
+                      <a:r>
+                        <a:rPr lang="fr-FR" sz="2000" dirty="0" smtClean="0"/>
+                        <a:t>DELETE</a:t>
+                      </a:r>
+                      <a:endParaRPr lang="fr-FR" sz="2000" dirty="0"/>
+                    </a:p>
+                  </a:txBody>
+                  <a:tcPr/>
+                </a:tc>
+                <a:tc>
+                  <a:txBody>
+                    <a:bodyPr/>
+                    <a:lstStyle/>
+                    <a:p>
+                      <a:r>
+                        <a:rPr lang="fr-FR" sz="2000" dirty="0" smtClean="0"/>
+                        <a:t>282</a:t>
+                      </a:r>
+                      <a:endParaRPr lang="fr-FR" sz="2000" dirty="0"/>
+                    </a:p>
+                  </a:txBody>
+                  <a:tcPr/>
+                </a:tc>
+                <a:tc>
+                  <a:txBody>
+                    <a:bodyPr/>
+                    <a:lstStyle/>
+                    <a:p>
+                      <a:r>
+                        <a:rPr lang="fr-FR" sz="2000" dirty="0" smtClean="0"/>
+                        <a:t>159</a:t>
+                      </a:r>
+                      <a:endParaRPr lang="fr-FR" sz="2000" dirty="0"/>
+                    </a:p>
+                  </a:txBody>
+                  <a:tcPr/>
+                </a:tc>
+                <a:tc>
+                  <a:txBody>
+                    <a:bodyPr/>
+                    <a:lstStyle/>
+                    <a:p>
+                      <a:r>
+                        <a:rPr lang="fr-FR" sz="2000" dirty="0" smtClean="0"/>
+                        <a:t>143</a:t>
+                      </a:r>
+                      <a:endParaRPr lang="fr-FR" sz="2000" dirty="0"/>
+                    </a:p>
+                  </a:txBody>
+                  <a:tcPr/>
+                </a:tc>
+                <a:tc>
+                  <a:txBody>
+                    <a:bodyPr/>
+                    <a:lstStyle/>
+                    <a:p>
+                      <a:r>
+                        <a:rPr lang="fr-FR" sz="2000" dirty="0" smtClean="0"/>
+                        <a:t>93</a:t>
+                      </a:r>
+                      <a:endParaRPr lang="fr-FR" sz="2000" dirty="0"/>
+                    </a:p>
+                  </a:txBody>
+                  <a:tcPr/>
+                </a:tc>
+              </a:tr>
+              <a:tr h="649716">
+                <a:tc>
+                  <a:txBody>
+                    <a:bodyPr/>
+                    <a:lstStyle/>
+                    <a:p>
+                      <a:r>
+                        <a:rPr lang="fr-FR" sz="2000" b="1" dirty="0" smtClean="0"/>
+                        <a:t>TOTAL</a:t>
+                      </a:r>
+                      <a:endParaRPr lang="fr-FR" sz="2000" b="1" dirty="0"/>
+                    </a:p>
+                  </a:txBody>
+                  <a:tcPr/>
+                </a:tc>
+                <a:tc>
+                  <a:txBody>
+                    <a:bodyPr/>
+                    <a:lstStyle/>
+                    <a:p>
+                      <a:r>
+                        <a:rPr lang="fr-FR" sz="2000" b="1" dirty="0" smtClean="0"/>
+                        <a:t>237</a:t>
+                      </a:r>
+                      <a:endParaRPr lang="fr-FR" sz="2000" b="1" dirty="0"/>
+                    </a:p>
+                  </a:txBody>
+                  <a:tcPr/>
+                </a:tc>
+                <a:tc>
+                  <a:txBody>
+                    <a:bodyPr/>
+                    <a:lstStyle/>
+                    <a:p>
+                      <a:r>
+                        <a:rPr lang="fr-FR" sz="2000" b="1" dirty="0" smtClean="0"/>
+                        <a:t>200</a:t>
+                      </a:r>
+                      <a:endParaRPr lang="fr-FR" sz="2000" b="1" dirty="0"/>
+                    </a:p>
+                  </a:txBody>
+                  <a:tcPr/>
+                </a:tc>
+                <a:tc>
+                  <a:txBody>
+                    <a:bodyPr/>
+                    <a:lstStyle/>
+                    <a:p>
+                      <a:r>
+                        <a:rPr lang="fr-FR" sz="2000" b="1" dirty="0" smtClean="0"/>
+                        <a:t>139</a:t>
+                      </a:r>
+                      <a:endParaRPr lang="fr-FR" sz="2000" b="1" dirty="0"/>
+                    </a:p>
+                  </a:txBody>
+                  <a:tcPr/>
+                </a:tc>
+                <a:tc>
+                  <a:txBody>
+                    <a:bodyPr/>
+                    <a:lstStyle/>
+                    <a:p>
+                      <a:r>
+                        <a:rPr lang="fr-FR" sz="2000" b="1" dirty="0" smtClean="0"/>
+                        <a:t>114</a:t>
+                      </a:r>
+                      <a:endParaRPr lang="fr-FR" sz="2000" b="1" dirty="0"/>
+                    </a:p>
+                  </a:txBody>
+                  <a:tcPr/>
+                </a:tc>
+              </a:tr>
+            </a:tbl>
+          </a:graphicData>
+        </a:graphic>
+      </p:graphicFrame>
     </p:spTree>
     <p:extLst>
       <p:ext uri="{BB962C8B-B14F-4D97-AF65-F5344CB8AC3E}">
-        <p14:creationId xmlns:p14="http://schemas.microsoft.com/office/powerpoint/2010/main" val="2990348095"/>
+        <p14:creationId xmlns:p14="http://schemas.microsoft.com/office/powerpoint/2010/main" val="2846883143"/>
       </p:ext>
     </p:extLst>
   </p:cSld>
@@ -7381,7 +8474,7 @@
   <p:timing>
     <p:tnLst>
       <p:par>
-        <p:cTn id="1" dur="indefinite" restart="never" nodeType="tmRoot"/>
+        <p:cTn xmlns:p14="http://schemas.microsoft.com/office/powerpoint/2010/main" id="1" dur="indefinite" restart="never" nodeType="tmRoot"/>
       </p:par>
     </p:tnLst>
   </p:timing>
@@ -7418,7 +8511,7 @@
         <p:spPr>
           <a:xfrm>
             <a:off x="684212" y="685801"/>
-            <a:ext cx="8534400" cy="1993900"/>
+            <a:ext cx="8534400" cy="599140"/>
           </a:xfrm>
         </p:spPr>
         <p:txBody>
@@ -7433,7 +8526,15 @@
                   <a:schemeClr val="tx1"/>
                 </a:solidFill>
               </a:rPr>
-              <a:t>Conclusion</a:t>
+              <a:t>Résultat </a:t>
+            </a:r>
+            <a:r>
+              <a:rPr lang="fr-CH" sz="2800" dirty="0" smtClean="0">
+                <a:solidFill>
+                  <a:schemeClr val="tx1"/>
+                </a:solidFill>
+              </a:rPr>
+              <a:t>benchmarking (100 threads)</a:t>
             </a:r>
             <a:endParaRPr lang="fr-CH" sz="2800" dirty="0" smtClean="0">
               <a:solidFill>
@@ -7467,10 +8568,557 @@
           </a:p>
         </p:txBody>
       </p:sp>
+      <p:graphicFrame>
+        <p:nvGraphicFramePr>
+          <p:cNvPr id="4" name="Tableau 3"/>
+          <p:cNvGraphicFramePr>
+            <a:graphicFrameLocks noGrp="1"/>
+          </p:cNvGraphicFramePr>
+          <p:nvPr>
+            <p:extLst>
+              <p:ext uri="{D42A27DB-BD31-4B8C-83A1-F6EECF244321}">
+                <p14:modId xmlns:p14="http://schemas.microsoft.com/office/powerpoint/2010/main" val="3787519958"/>
+              </p:ext>
+            </p:extLst>
+          </p:nvPr>
+        </p:nvGraphicFramePr>
+        <p:xfrm>
+          <a:off x="597650" y="1511544"/>
+          <a:ext cx="10189880" cy="4659160"/>
+        </p:xfrm>
+        <a:graphic>
+          <a:graphicData uri="http://schemas.openxmlformats.org/drawingml/2006/table">
+            <a:tbl>
+              <a:tblPr firstRow="1" bandRow="1">
+                <a:tableStyleId>{3B4B98B0-60AC-42C2-AFA5-B58CD77FA1E5}</a:tableStyleId>
+              </a:tblPr>
+              <a:tblGrid>
+                <a:gridCol w="2037976"/>
+                <a:gridCol w="2037976"/>
+                <a:gridCol w="2037976"/>
+                <a:gridCol w="2037976"/>
+                <a:gridCol w="2037976"/>
+              </a:tblGrid>
+              <a:tr h="760864">
+                <a:tc>
+                  <a:txBody>
+                    <a:bodyPr/>
+                    <a:lstStyle/>
+                    <a:p>
+                      <a:r>
+                        <a:rPr lang="fr-FR" sz="2000" dirty="0" smtClean="0"/>
+                        <a:t>Opération</a:t>
+                      </a:r>
+                      <a:endParaRPr lang="fr-FR" sz="2000" dirty="0"/>
+                    </a:p>
+                  </a:txBody>
+                  <a:tcPr/>
+                </a:tc>
+                <a:tc>
+                  <a:txBody>
+                    <a:bodyPr/>
+                    <a:lstStyle/>
+                    <a:p>
+                      <a:r>
+                        <a:rPr lang="fr-FR" sz="2000" dirty="0" smtClean="0"/>
+                        <a:t>One server</a:t>
+                      </a:r>
+                      <a:endParaRPr lang="fr-FR" sz="2000" dirty="0"/>
+                    </a:p>
+                  </a:txBody>
+                  <a:tcPr/>
+                </a:tc>
+                <a:tc>
+                  <a:txBody>
+                    <a:bodyPr/>
+                    <a:lstStyle/>
+                    <a:p>
+                      <a:r>
+                        <a:rPr lang="fr-FR" sz="2000" dirty="0" smtClean="0"/>
+                        <a:t>Cluster</a:t>
+                      </a:r>
+                      <a:endParaRPr lang="fr-FR" sz="2000" dirty="0"/>
+                    </a:p>
+                  </a:txBody>
+                  <a:tcPr/>
+                </a:tc>
+                <a:tc>
+                  <a:txBody>
+                    <a:bodyPr/>
+                    <a:lstStyle/>
+                    <a:p>
+                      <a:r>
+                        <a:rPr lang="fr-FR" sz="2000" dirty="0" smtClean="0"/>
+                        <a:t>One</a:t>
+                      </a:r>
+                      <a:r>
+                        <a:rPr lang="fr-FR" sz="2000" baseline="0" dirty="0" smtClean="0"/>
+                        <a:t> server + cache</a:t>
+                      </a:r>
+                      <a:endParaRPr lang="fr-FR" sz="2000" dirty="0"/>
+                    </a:p>
+                  </a:txBody>
+                  <a:tcPr/>
+                </a:tc>
+                <a:tc>
+                  <a:txBody>
+                    <a:bodyPr/>
+                    <a:lstStyle/>
+                    <a:p>
+                      <a:r>
+                        <a:rPr lang="fr-FR" sz="2000" dirty="0" smtClean="0"/>
+                        <a:t>Cluster</a:t>
+                      </a:r>
+                      <a:r>
+                        <a:rPr lang="fr-FR" sz="2000" baseline="0" dirty="0" smtClean="0"/>
+                        <a:t> + cache</a:t>
+                      </a:r>
+                      <a:endParaRPr lang="fr-FR" sz="2000" dirty="0"/>
+                    </a:p>
+                  </a:txBody>
+                  <a:tcPr/>
+                </a:tc>
+              </a:tr>
+              <a:tr h="649716">
+                <a:tc>
+                  <a:txBody>
+                    <a:bodyPr/>
+                    <a:lstStyle/>
+                    <a:p>
+                      <a:r>
+                        <a:rPr lang="fr-FR" sz="2000" dirty="0" smtClean="0"/>
+                        <a:t>POST</a:t>
+                      </a:r>
+                      <a:endParaRPr lang="fr-FR" sz="2000" dirty="0"/>
+                    </a:p>
+                  </a:txBody>
+                  <a:tcPr/>
+                </a:tc>
+                <a:tc>
+                  <a:txBody>
+                    <a:bodyPr/>
+                    <a:lstStyle/>
+                    <a:p>
+                      <a:r>
+                        <a:rPr lang="fr-FR" sz="2000" dirty="0" smtClean="0"/>
+                        <a:t>483</a:t>
+                      </a:r>
+                      <a:endParaRPr lang="fr-FR" sz="2000" dirty="0"/>
+                    </a:p>
+                  </a:txBody>
+                  <a:tcPr/>
+                </a:tc>
+                <a:tc>
+                  <a:txBody>
+                    <a:bodyPr/>
+                    <a:lstStyle/>
+                    <a:p>
+                      <a:r>
+                        <a:rPr lang="fr-FR" sz="2000" dirty="0" smtClean="0"/>
+                        <a:t>440</a:t>
+                      </a:r>
+                      <a:endParaRPr lang="fr-FR" sz="2000" dirty="0"/>
+                    </a:p>
+                  </a:txBody>
+                  <a:tcPr/>
+                </a:tc>
+                <a:tc>
+                  <a:txBody>
+                    <a:bodyPr/>
+                    <a:lstStyle/>
+                    <a:p>
+                      <a:r>
+                        <a:rPr lang="fr-FR" sz="2000" dirty="0" smtClean="0"/>
+                        <a:t>259</a:t>
+                      </a:r>
+                      <a:endParaRPr lang="fr-FR" sz="2000" dirty="0"/>
+                    </a:p>
+                  </a:txBody>
+                  <a:tcPr/>
+                </a:tc>
+                <a:tc>
+                  <a:txBody>
+                    <a:bodyPr/>
+                    <a:lstStyle/>
+                    <a:p>
+                      <a:r>
+                        <a:rPr lang="fr-FR" sz="2000" dirty="0" smtClean="0"/>
+                        <a:t>221</a:t>
+                      </a:r>
+                      <a:endParaRPr lang="fr-FR" sz="2000" dirty="0"/>
+                    </a:p>
+                  </a:txBody>
+                  <a:tcPr/>
+                </a:tc>
+              </a:tr>
+              <a:tr h="649716">
+                <a:tc>
+                  <a:txBody>
+                    <a:bodyPr/>
+                    <a:lstStyle/>
+                    <a:p>
+                      <a:r>
+                        <a:rPr lang="fr-FR" sz="2000" dirty="0" smtClean="0"/>
+                        <a:t>PUT</a:t>
+                      </a:r>
+                      <a:endParaRPr lang="fr-FR" sz="2000" dirty="0"/>
+                    </a:p>
+                  </a:txBody>
+                  <a:tcPr/>
+                </a:tc>
+                <a:tc>
+                  <a:txBody>
+                    <a:bodyPr/>
+                    <a:lstStyle/>
+                    <a:p>
+                      <a:r>
+                        <a:rPr lang="fr-FR" sz="2000" dirty="0" smtClean="0"/>
+                        <a:t>498</a:t>
+                      </a:r>
+                      <a:endParaRPr lang="fr-FR" sz="2000" dirty="0"/>
+                    </a:p>
+                  </a:txBody>
+                  <a:tcPr/>
+                </a:tc>
+                <a:tc>
+                  <a:txBody>
+                    <a:bodyPr/>
+                    <a:lstStyle/>
+                    <a:p>
+                      <a:r>
+                        <a:rPr lang="fr-FR" sz="2000" dirty="0" smtClean="0"/>
+                        <a:t>433</a:t>
+                      </a:r>
+                      <a:endParaRPr lang="fr-FR" sz="2000" dirty="0"/>
+                    </a:p>
+                  </a:txBody>
+                  <a:tcPr/>
+                </a:tc>
+                <a:tc>
+                  <a:txBody>
+                    <a:bodyPr/>
+                    <a:lstStyle/>
+                    <a:p>
+                      <a:r>
+                        <a:rPr lang="fr-FR" sz="2000" dirty="0" smtClean="0"/>
+                        <a:t>262</a:t>
+                      </a:r>
+                      <a:endParaRPr lang="fr-FR" sz="2000" dirty="0"/>
+                    </a:p>
+                  </a:txBody>
+                  <a:tcPr/>
+                </a:tc>
+                <a:tc>
+                  <a:txBody>
+                    <a:bodyPr/>
+                    <a:lstStyle/>
+                    <a:p>
+                      <a:r>
+                        <a:rPr lang="fr-FR" sz="2000" dirty="0" smtClean="0"/>
+                        <a:t>252</a:t>
+                      </a:r>
+                      <a:endParaRPr lang="fr-FR" sz="2000" dirty="0"/>
+                    </a:p>
+                  </a:txBody>
+                  <a:tcPr/>
+                </a:tc>
+              </a:tr>
+              <a:tr h="649716">
+                <a:tc>
+                  <a:txBody>
+                    <a:bodyPr/>
+                    <a:lstStyle/>
+                    <a:p>
+                      <a:r>
+                        <a:rPr lang="fr-FR" sz="2000" dirty="0" smtClean="0"/>
+                        <a:t>GET (ONE)</a:t>
+                      </a:r>
+                      <a:endParaRPr lang="fr-FR" sz="2000" dirty="0"/>
+                    </a:p>
+                  </a:txBody>
+                  <a:tcPr/>
+                </a:tc>
+                <a:tc>
+                  <a:txBody>
+                    <a:bodyPr/>
+                    <a:lstStyle/>
+                    <a:p>
+                      <a:r>
+                        <a:rPr lang="fr-FR" sz="2000" dirty="0" smtClean="0"/>
+                        <a:t>522</a:t>
+                      </a:r>
+                      <a:endParaRPr lang="fr-FR" sz="2000" dirty="0"/>
+                    </a:p>
+                  </a:txBody>
+                  <a:tcPr/>
+                </a:tc>
+                <a:tc>
+                  <a:txBody>
+                    <a:bodyPr/>
+                    <a:lstStyle/>
+                    <a:p>
+                      <a:r>
+                        <a:rPr lang="fr-FR" sz="2000" dirty="0" smtClean="0"/>
+                        <a:t>443</a:t>
+                      </a:r>
+                      <a:endParaRPr lang="fr-FR" sz="2000" dirty="0"/>
+                    </a:p>
+                  </a:txBody>
+                  <a:tcPr/>
+                </a:tc>
+                <a:tc>
+                  <a:txBody>
+                    <a:bodyPr/>
+                    <a:lstStyle/>
+                    <a:p>
+                      <a:r>
+                        <a:rPr lang="fr-FR" sz="2000" dirty="0" smtClean="0"/>
+                        <a:t>264</a:t>
+                      </a:r>
+                      <a:endParaRPr lang="fr-FR" sz="2000" dirty="0"/>
+                    </a:p>
+                  </a:txBody>
+                  <a:tcPr/>
+                </a:tc>
+                <a:tc>
+                  <a:txBody>
+                    <a:bodyPr/>
+                    <a:lstStyle/>
+                    <a:p>
+                      <a:r>
+                        <a:rPr lang="fr-FR" sz="2000" dirty="0" smtClean="0"/>
+                        <a:t>240</a:t>
+                      </a:r>
+                      <a:endParaRPr lang="fr-FR" sz="2000" dirty="0"/>
+                    </a:p>
+                  </a:txBody>
+                  <a:tcPr/>
+                </a:tc>
+              </a:tr>
+              <a:tr h="649716">
+                <a:tc>
+                  <a:txBody>
+                    <a:bodyPr/>
+                    <a:lstStyle/>
+                    <a:p>
+                      <a:r>
+                        <a:rPr lang="fr-FR" sz="2000" dirty="0" smtClean="0"/>
+                        <a:t>GET (ALL)</a:t>
+                      </a:r>
+                      <a:endParaRPr lang="fr-FR" sz="2000" dirty="0"/>
+                    </a:p>
+                  </a:txBody>
+                  <a:tcPr/>
+                </a:tc>
+                <a:tc>
+                  <a:txBody>
+                    <a:bodyPr/>
+                    <a:lstStyle/>
+                    <a:p>
+                      <a:r>
+                        <a:rPr lang="fr-FR" sz="2000" dirty="0" smtClean="0"/>
+                        <a:t>581</a:t>
+                      </a:r>
+                      <a:endParaRPr lang="fr-FR" sz="2000" dirty="0"/>
+                    </a:p>
+                  </a:txBody>
+                  <a:tcPr/>
+                </a:tc>
+                <a:tc>
+                  <a:txBody>
+                    <a:bodyPr/>
+                    <a:lstStyle/>
+                    <a:p>
+                      <a:r>
+                        <a:rPr lang="fr-FR" sz="2000" dirty="0" smtClean="0"/>
+                        <a:t>569</a:t>
+                      </a:r>
+                      <a:endParaRPr lang="fr-FR" sz="2000" dirty="0"/>
+                    </a:p>
+                  </a:txBody>
+                  <a:tcPr/>
+                </a:tc>
+                <a:tc>
+                  <a:txBody>
+                    <a:bodyPr/>
+                    <a:lstStyle/>
+                    <a:p>
+                      <a:r>
+                        <a:rPr lang="fr-FR" sz="2000" dirty="0" smtClean="0"/>
+                        <a:t>300</a:t>
+                      </a:r>
+                      <a:endParaRPr lang="fr-FR" sz="2000" dirty="0"/>
+                    </a:p>
+                  </a:txBody>
+                  <a:tcPr/>
+                </a:tc>
+                <a:tc>
+                  <a:txBody>
+                    <a:bodyPr/>
+                    <a:lstStyle/>
+                    <a:p>
+                      <a:r>
+                        <a:rPr lang="fr-FR" sz="2000" dirty="0" smtClean="0"/>
+                        <a:t>306</a:t>
+                      </a:r>
+                      <a:endParaRPr lang="fr-FR" sz="2000" dirty="0"/>
+                    </a:p>
+                  </a:txBody>
+                  <a:tcPr/>
+                </a:tc>
+              </a:tr>
+              <a:tr h="649716">
+                <a:tc>
+                  <a:txBody>
+                    <a:bodyPr/>
+                    <a:lstStyle/>
+                    <a:p>
+                      <a:r>
+                        <a:rPr lang="fr-FR" sz="2000" dirty="0" smtClean="0"/>
+                        <a:t>DELETE</a:t>
+                      </a:r>
+                      <a:endParaRPr lang="fr-FR" sz="2000" dirty="0"/>
+                    </a:p>
+                  </a:txBody>
+                  <a:tcPr/>
+                </a:tc>
+                <a:tc>
+                  <a:txBody>
+                    <a:bodyPr/>
+                    <a:lstStyle/>
+                    <a:p>
+                      <a:r>
+                        <a:rPr lang="fr-FR" sz="2000" dirty="0" smtClean="0"/>
+                        <a:t>563</a:t>
+                      </a:r>
+                      <a:endParaRPr lang="fr-FR" sz="2000" dirty="0"/>
+                    </a:p>
+                  </a:txBody>
+                  <a:tcPr/>
+                </a:tc>
+                <a:tc>
+                  <a:txBody>
+                    <a:bodyPr/>
+                    <a:lstStyle/>
+                    <a:p>
+                      <a:r>
+                        <a:rPr lang="fr-FR" sz="2000" dirty="0" smtClean="0"/>
+                        <a:t>465</a:t>
+                      </a:r>
+                      <a:endParaRPr lang="fr-FR" sz="2000" dirty="0"/>
+                    </a:p>
+                  </a:txBody>
+                  <a:tcPr/>
+                </a:tc>
+                <a:tc>
+                  <a:txBody>
+                    <a:bodyPr/>
+                    <a:lstStyle/>
+                    <a:p>
+                      <a:r>
+                        <a:rPr lang="fr-FR" sz="2000" dirty="0" smtClean="0"/>
+                        <a:t>284</a:t>
+                      </a:r>
+                      <a:endParaRPr lang="fr-FR" sz="2000" dirty="0"/>
+                    </a:p>
+                  </a:txBody>
+                  <a:tcPr/>
+                </a:tc>
+                <a:tc>
+                  <a:txBody>
+                    <a:bodyPr/>
+                    <a:lstStyle/>
+                    <a:p>
+                      <a:r>
+                        <a:rPr lang="fr-FR" sz="2000" dirty="0" smtClean="0"/>
+                        <a:t>272</a:t>
+                      </a:r>
+                      <a:endParaRPr lang="fr-FR" sz="2000" dirty="0"/>
+                    </a:p>
+                  </a:txBody>
+                  <a:tcPr/>
+                </a:tc>
+              </a:tr>
+              <a:tr h="649716">
+                <a:tc>
+                  <a:txBody>
+                    <a:bodyPr/>
+                    <a:lstStyle/>
+                    <a:p>
+                      <a:r>
+                        <a:rPr lang="fr-FR" sz="2000" b="1" dirty="0" smtClean="0"/>
+                        <a:t>TOTAL</a:t>
+                      </a:r>
+                      <a:endParaRPr lang="fr-FR" sz="2000" b="1" dirty="0"/>
+                    </a:p>
+                  </a:txBody>
+                  <a:tcPr/>
+                </a:tc>
+                <a:tc>
+                  <a:txBody>
+                    <a:bodyPr/>
+                    <a:lstStyle/>
+                    <a:p>
+                      <a:r>
+                        <a:rPr lang="fr-FR" sz="2000" b="1" dirty="0" smtClean="0"/>
+                        <a:t>543</a:t>
+                      </a:r>
+                      <a:endParaRPr lang="fr-FR" sz="2000" b="1" dirty="0"/>
+                    </a:p>
+                  </a:txBody>
+                  <a:tcPr/>
+                </a:tc>
+                <a:tc>
+                  <a:txBody>
+                    <a:bodyPr/>
+                    <a:lstStyle/>
+                    <a:p>
+                      <a:r>
+                        <a:rPr lang="fr-FR" sz="2000" b="1" dirty="0" smtClean="0"/>
+                        <a:t>492</a:t>
+                      </a:r>
+                      <a:endParaRPr lang="fr-FR" sz="2000" b="1" dirty="0"/>
+                    </a:p>
+                  </a:txBody>
+                  <a:tcPr/>
+                </a:tc>
+                <a:tc>
+                  <a:txBody>
+                    <a:bodyPr/>
+                    <a:lstStyle/>
+                    <a:p>
+                      <a:r>
+                        <a:rPr lang="fr-FR" sz="2000" b="1" dirty="0" smtClean="0"/>
+                        <a:t>278</a:t>
+                      </a:r>
+                      <a:endParaRPr lang="fr-FR" sz="2000" b="1" dirty="0"/>
+                    </a:p>
+                  </a:txBody>
+                  <a:tcPr/>
+                </a:tc>
+                <a:tc>
+                  <a:txBody>
+                    <a:bodyPr/>
+                    <a:lstStyle/>
+                    <a:p>
+                      <a:r>
+                        <a:rPr lang="fr-FR" sz="2000" b="1" dirty="0" smtClean="0"/>
+                        <a:t>267</a:t>
+                      </a:r>
+                      <a:endParaRPr lang="fr-FR" sz="2000" b="1" dirty="0"/>
+                    </a:p>
+                  </a:txBody>
+                  <a:tcPr/>
+                </a:tc>
+              </a:tr>
+            </a:tbl>
+          </a:graphicData>
+        </a:graphic>
+      </p:graphicFrame>
     </p:spTree>
     <p:extLst>
       <p:ext uri="{BB962C8B-B14F-4D97-AF65-F5344CB8AC3E}">
-        <p14:creationId xmlns:p14="http://schemas.microsoft.com/office/powerpoint/2010/main" val="1650422423"/>
+        <p14:creationId xmlns:p14="http://schemas.microsoft.com/office/powerpoint/2010/main" val="3579566566"/>
       </p:ext>
     </p:extLst>
   </p:cSld>
@@ -7480,7 +9128,7 @@
   <p:timing>
     <p:tnLst>
       <p:par>
-        <p:cTn id="1" dur="indefinite" restart="never" nodeType="tmRoot"/>
+        <p:cTn xmlns:p14="http://schemas.microsoft.com/office/powerpoint/2010/main" id="1" dur="indefinite" restart="never" nodeType="tmRoot"/>
       </p:par>
     </p:tnLst>
   </p:timing>
@@ -7534,11 +9182,6 @@
               </a:rPr>
               <a:t>Question ?</a:t>
             </a:r>
-            <a:endParaRPr lang="fr-CH" sz="2800" dirty="0" smtClean="0">
-              <a:solidFill>
-                <a:schemeClr val="tx1"/>
-              </a:solidFill>
-            </a:endParaRPr>
           </a:p>
         </p:txBody>
       </p:sp>
@@ -7579,7 +9222,7 @@
   <p:timing>
     <p:tnLst>
       <p:par>
-        <p:cTn id="1" dur="indefinite" restart="never" nodeType="tmRoot"/>
+        <p:cTn xmlns:p14="http://schemas.microsoft.com/office/powerpoint/2010/main" id="1" dur="indefinite" restart="never" nodeType="tmRoot"/>
       </p:par>
     </p:tnLst>
   </p:timing>
@@ -7759,7 +9402,7 @@
   <p:timing>
     <p:tnLst>
       <p:par>
-        <p:cTn id="1" dur="indefinite" restart="never" nodeType="tmRoot"/>
+        <p:cTn xmlns:p14="http://schemas.microsoft.com/office/powerpoint/2010/main" id="1" dur="indefinite" restart="never" nodeType="tmRoot"/>
       </p:par>
     </p:tnLst>
   </p:timing>
@@ -7822,7 +9465,15 @@
                   <a:schemeClr val="tx1"/>
                 </a:solidFill>
               </a:rPr>
-              <a:t>1 serveurs </a:t>
+              <a:t>1 </a:t>
+            </a:r>
+            <a:r>
+              <a:rPr lang="fr-CH" sz="2000" dirty="0" smtClean="0">
+                <a:solidFill>
+                  <a:schemeClr val="tx1"/>
+                </a:solidFill>
+              </a:rPr>
+              <a:t>serveur </a:t>
             </a:r>
             <a:r>
               <a:rPr lang="fr-CH" sz="2000" dirty="0">
@@ -7933,7 +9584,7 @@
   <p:timing>
     <p:tnLst>
       <p:par>
-        <p:cTn id="1" dur="indefinite" restart="never" nodeType="tmRoot"/>
+        <p:cTn xmlns:p14="http://schemas.microsoft.com/office/powerpoint/2010/main" id="1" dur="indefinite" restart="never" nodeType="tmRoot"/>
       </p:par>
     </p:tnLst>
   </p:timing>
@@ -7987,11 +9638,6 @@
               </a:rPr>
               <a:t>Développement d’une API REST</a:t>
             </a:r>
-            <a:endParaRPr lang="fr-CH" sz="2800" dirty="0" smtClean="0">
-              <a:solidFill>
-                <a:schemeClr val="tx1"/>
-              </a:solidFill>
-            </a:endParaRPr>
           </a:p>
           <a:p>
             <a:pPr lvl="1"/>
@@ -8019,11 +9665,6 @@
               </a:rPr>
               <a:t> Play</a:t>
             </a:r>
-            <a:endParaRPr lang="fr-CH" sz="2400" dirty="0" smtClean="0">
-              <a:solidFill>
-                <a:schemeClr val="tx1"/>
-              </a:solidFill>
-            </a:endParaRPr>
           </a:p>
           <a:p>
             <a:pPr lvl="1"/>
@@ -8033,15 +9674,7 @@
                   <a:schemeClr val="tx1"/>
                 </a:solidFill>
               </a:rPr>
-              <a:t>Gestion des transactions pour éviter levée exception lor</a:t>
-            </a:r>
-            <a:r>
-              <a:rPr lang="fr-CH" sz="2400" dirty="0" smtClean="0">
-                <a:solidFill>
-                  <a:schemeClr val="tx1"/>
-                </a:solidFill>
-              </a:rPr>
-              <a:t>s du </a:t>
+              <a:t>Gestion des transactions pour éviter levée exception lors du </a:t>
             </a:r>
             <a:r>
               <a:rPr lang="fr-CH" sz="2400" dirty="0" err="1" smtClean="0">
@@ -8180,7 +9813,7 @@
   <p:timing>
     <p:tnLst>
       <p:par>
-        <p:cTn id="1" dur="indefinite" restart="never" nodeType="tmRoot"/>
+        <p:cTn xmlns:p14="http://schemas.microsoft.com/office/powerpoint/2010/main" id="1" dur="indefinite" restart="never" nodeType="tmRoot"/>
       </p:par>
     </p:tnLst>
   </p:timing>
@@ -8250,11 +9883,6 @@
               </a:rPr>
               <a:t> balancer</a:t>
             </a:r>
-            <a:endParaRPr lang="fr-CH" dirty="0" smtClean="0">
-              <a:solidFill>
-                <a:schemeClr val="tx1"/>
-              </a:solidFill>
-            </a:endParaRPr>
           </a:p>
           <a:p>
             <a:pPr lvl="1"/>
@@ -8291,23 +9919,7 @@
                   <a:schemeClr val="tx1"/>
                 </a:solidFill>
               </a:rPr>
-              <a:t>2</a:t>
-            </a:r>
-            <a:r>
-              <a:rPr lang="fr-CH" sz="2000" dirty="0" smtClean="0">
-                <a:solidFill>
-                  <a:schemeClr val="tx1"/>
-                </a:solidFill>
-              </a:rPr>
-              <a:t> </a:t>
-            </a:r>
-            <a:r>
-              <a:rPr lang="fr-CH" sz="2000" dirty="0" smtClean="0">
-                <a:solidFill>
-                  <a:schemeClr val="tx1"/>
-                </a:solidFill>
-              </a:rPr>
-              <a:t>serveurs </a:t>
+              <a:t>2 serveurs </a:t>
             </a:r>
             <a:r>
               <a:rPr lang="fr-CH" sz="2000" dirty="0">
@@ -8418,7 +10030,7 @@
   <p:timing>
     <p:tnLst>
       <p:par>
-        <p:cTn id="1" dur="indefinite" restart="never" nodeType="tmRoot"/>
+        <p:cTn xmlns:p14="http://schemas.microsoft.com/office/powerpoint/2010/main" id="1" dur="indefinite" restart="never" nodeType="tmRoot"/>
       </p:par>
     </p:tnLst>
   </p:timing>
@@ -8470,21 +10082,8 @@
                   <a:schemeClr val="tx1"/>
                 </a:solidFill>
               </a:rPr>
-              <a:t>Architecture </a:t>
-            </a:r>
-            <a:r>
-              <a:rPr lang="fr-CH" dirty="0" smtClean="0">
-                <a:solidFill>
-                  <a:schemeClr val="tx1"/>
-                </a:solidFill>
-              </a:rPr>
-              <a:t>avec cache</a:t>
-            </a:r>
-            <a:endParaRPr lang="fr-CH" dirty="0" smtClean="0">
-              <a:solidFill>
-                <a:schemeClr val="tx1"/>
-              </a:solidFill>
-            </a:endParaRPr>
+              <a:t>Architecture avec cache</a:t>
+            </a:r>
           </a:p>
           <a:p>
             <a:pPr lvl="1"/>
@@ -8556,15 +10155,7 @@
                   <a:schemeClr val="tx1"/>
                 </a:solidFill>
               </a:rPr>
-              <a:t>1 </a:t>
-            </a:r>
-            <a:r>
-              <a:rPr lang="fr-CH" sz="2000" dirty="0" smtClean="0">
-                <a:solidFill>
-                  <a:schemeClr val="tx1"/>
-                </a:solidFill>
-              </a:rPr>
-              <a:t>base </a:t>
+              <a:t>1 base </a:t>
             </a:r>
             <a:r>
               <a:rPr lang="fr-CH" sz="2000" dirty="0">
@@ -8651,7 +10242,7 @@
   <p:timing>
     <p:tnLst>
       <p:par>
-        <p:cTn id="1" dur="indefinite" restart="never" nodeType="tmRoot"/>
+        <p:cTn xmlns:p14="http://schemas.microsoft.com/office/powerpoint/2010/main" id="1" dur="indefinite" restart="never" nodeType="tmRoot"/>
       </p:par>
     </p:tnLst>
   </p:timing>
@@ -8767,11 +10358,6 @@
               </a:rPr>
               <a:t>cache synchronisée)</a:t>
             </a:r>
-            <a:endParaRPr lang="fr-CH" sz="2000" dirty="0" smtClean="0">
-              <a:solidFill>
-                <a:schemeClr val="tx1"/>
-              </a:solidFill>
-            </a:endParaRPr>
           </a:p>
           <a:p>
             <a:pPr lvl="1"/>
@@ -8781,15 +10367,7 @@
                   <a:schemeClr val="tx1"/>
                 </a:solidFill>
               </a:rPr>
-              <a:t>1 </a:t>
-            </a:r>
-            <a:r>
-              <a:rPr lang="fr-CH" sz="2000" dirty="0" smtClean="0">
-                <a:solidFill>
-                  <a:schemeClr val="tx1"/>
-                </a:solidFill>
-              </a:rPr>
-              <a:t>base </a:t>
+              <a:t>1 base </a:t>
             </a:r>
             <a:r>
               <a:rPr lang="fr-CH" sz="2000" dirty="0">
@@ -8876,7 +10454,7 @@
   <p:timing>
     <p:tnLst>
       <p:par>
-        <p:cTn id="1" dur="indefinite" restart="never" nodeType="tmRoot"/>
+        <p:cTn xmlns:p14="http://schemas.microsoft.com/office/powerpoint/2010/main" id="1" dur="indefinite" restart="never" nodeType="tmRoot"/>
       </p:par>
     </p:tnLst>
   </p:timing>
@@ -8938,11 +10516,6 @@
               </a:rPr>
               <a:t>performances</a:t>
             </a:r>
-            <a:endParaRPr lang="fr-CH" sz="2800" dirty="0" smtClean="0">
-              <a:solidFill>
-                <a:schemeClr val="tx1"/>
-              </a:solidFill>
-            </a:endParaRPr>
           </a:p>
           <a:p>
             <a:pPr lvl="1"/>
@@ -9193,7 +10766,7 @@
   <p:timing>
     <p:tnLst>
       <p:par>
-        <p:cTn id="1" dur="indefinite" restart="never" nodeType="tmRoot"/>
+        <p:cTn xmlns:p14="http://schemas.microsoft.com/office/powerpoint/2010/main" id="1" dur="indefinite" restart="never" nodeType="tmRoot"/>
       </p:par>
     </p:tnLst>
   </p:timing>
@@ -9255,11 +10828,6 @@
               </a:rPr>
               <a:t>performances</a:t>
             </a:r>
-            <a:endParaRPr lang="fr-CH" sz="2800" dirty="0" smtClean="0">
-              <a:solidFill>
-                <a:schemeClr val="tx1"/>
-              </a:solidFill>
-            </a:endParaRPr>
           </a:p>
           <a:p>
             <a:pPr lvl="1"/>
@@ -9442,7 +11010,7 @@
   <p:timing>
     <p:tnLst>
       <p:par>
-        <p:cTn id="1" dur="indefinite" restart="never" nodeType="tmRoot"/>
+        <p:cTn xmlns:p14="http://schemas.microsoft.com/office/powerpoint/2010/main" id="1" dur="indefinite" restart="never" nodeType="tmRoot"/>
       </p:par>
     </p:tnLst>
   </p:timing>
@@ -9492,7 +11060,7 @@
     </a:clrScheme>
     <a:fontScheme name="Secteur">
       <a:majorFont>
-        <a:latin typeface="Century Gothic" panose="020B0502020202020204"/>
+        <a:latin typeface="Century Gothic"/>
         <a:ea typeface=""/>
         <a:cs typeface=""/>
         <a:font script="Jpan" typeface="メイリオ"/>
@@ -9527,7 +11095,7 @@
         <a:font script="Geor" typeface="Sylfaen"/>
       </a:majorFont>
       <a:minorFont>
-        <a:latin typeface="Century Gothic" panose="020B0502020202020204"/>
+        <a:latin typeface="Century Gothic"/>
         <a:ea typeface=""/>
         <a:cs typeface=""/>
         <a:font script="Jpan" typeface="メイリオ"/>
@@ -9717,7 +11285,7 @@
   <a:extraClrSchemeLst/>
   <a:extLst>
     <a:ext uri="{05A4C25C-085E-4340-85A3-A5531E510DB2}">
-      <thm15:themeFamily xmlns:thm15="http://schemas.microsoft.com/office/thememl/2012/main" name="Slice" id="{0507925B-6AC9-4358-8E18-C330545D08F8}" vid="{13FEC7C6-62A9-40C4-99D2-581AACACAA2F}"/>
+      <thm15:themeFamily xmlns:thm15="http://schemas.microsoft.com/office/thememl/2012/main" xmlns="" name="Slice" id="{0507925B-6AC9-4358-8E18-C330545D08F8}" vid="{13FEC7C6-62A9-40C4-99D2-581AACACAA2F}"/>
     </a:ext>
   </a:extLst>
 </a:theme>
@@ -9766,7 +11334,7 @@
     </a:clrScheme>
     <a:fontScheme name="Office">
       <a:majorFont>
-        <a:latin typeface="Calibri Light" panose="020F0302020204030204"/>
+        <a:latin typeface="Calibri Light"/>
         <a:ea typeface=""/>
         <a:cs typeface=""/>
         <a:font script="Jpan" typeface="ＭＳ Ｐゴシック"/>
@@ -9801,7 +11369,7 @@
         <a:font script="Geor" typeface="Sylfaen"/>
       </a:majorFont>
       <a:minorFont>
-        <a:latin typeface="Calibri" panose="020F0502020204030204"/>
+        <a:latin typeface="Calibri"/>
         <a:ea typeface=""/>
         <a:cs typeface=""/>
         <a:font script="Jpan" typeface="ＭＳ Ｐゴシック"/>
@@ -9978,7 +11546,7 @@
   <a:extraClrSchemeLst/>
   <a:extLst>
     <a:ext uri="{05A4C25C-085E-4340-85A3-A5531E510DB2}">
-      <thm15:themeFamily xmlns:thm15="http://schemas.microsoft.com/office/thememl/2012/main" name="Office Theme" id="{62F939B6-93AF-4DB8-9C6B-D6C7DFDC589F}" vid="{4A3C46E8-61CC-4603-A589-7422A47A8E4A}"/>
+      <thm15:themeFamily xmlns:thm15="http://schemas.microsoft.com/office/thememl/2012/main" xmlns="" name="Office Theme" id="{62F939B6-93AF-4DB8-9C6B-D6C7DFDC589F}" vid="{4A3C46E8-61CC-4603-A589-7422A47A8E4A}"/>
     </a:ext>
   </a:extLst>
 </a:theme>

</xml_diff>

<commit_message>
add graphique to presentation and report
</commit_message>
<xml_diff>
--- a/Presentation/Caching-Team1.pptx
+++ b/Presentation/Caching-Team1.pptx
@@ -5,7 +5,7 @@
     <p:sldMasterId id="2147483669" r:id="rId1"/>
   </p:sldMasterIdLst>
   <p:notesMasterIdLst>
-    <p:notesMasterId r:id="rId15"/>
+    <p:notesMasterId r:id="rId16"/>
   </p:notesMasterIdLst>
   <p:sldIdLst>
     <p:sldId id="256" r:id="rId2"/>
@@ -20,7 +20,8 @@
     <p:sldId id="269" r:id="rId11"/>
     <p:sldId id="273" r:id="rId12"/>
     <p:sldId id="274" r:id="rId13"/>
-    <p:sldId id="271" r:id="rId14"/>
+    <p:sldId id="275" r:id="rId14"/>
+    <p:sldId id="271" r:id="rId15"/>
   </p:sldIdLst>
   <p:sldSz cx="12192000" cy="6858000"/>
   <p:notesSz cx="6858000" cy="9144000"/>
@@ -121,7 +122,7 @@
   </p:defaultTextStyle>
   <p:extLst>
     <p:ext uri="{EFAFB233-063F-42B5-8137-9DF3F51BA10A}">
-      <p15:sldGuideLst xmlns:p15="http://schemas.microsoft.com/office/powerpoint/2012/main" xmlns=""/>
+      <p15:sldGuideLst xmlns="" xmlns:p15="http://schemas.microsoft.com/office/powerpoint/2012/main"/>
     </p:ext>
   </p:extLst>
 </p:presentation>
@@ -878,7 +879,7 @@
           <a:p>
             <a:fld id="{6A60D253-495A-493B-97BB-B92F1FA596BA}" type="slidenum">
               <a:rPr lang="fr-CH" smtClean="0"/>
-              <a:t>13</a:t>
+              <a:t>14</a:t>
             </a:fld>
             <a:endParaRPr lang="fr-CH"/>
           </a:p>
@@ -7219,21 +7220,8 @@
                   <a:schemeClr val="tx1"/>
                 </a:solidFill>
               </a:rPr>
-              <a:t>Résultat </a:t>
-            </a:r>
-            <a:r>
-              <a:rPr lang="fr-CH" sz="2800" dirty="0" smtClean="0">
-                <a:solidFill>
-                  <a:schemeClr val="tx1"/>
-                </a:solidFill>
-              </a:rPr>
-              <a:t>benchmarking (10 threads)</a:t>
-            </a:r>
-            <a:endParaRPr lang="fr-CH" sz="2800" dirty="0" smtClean="0">
-              <a:solidFill>
-                <a:schemeClr val="tx1"/>
-              </a:solidFill>
-            </a:endParaRPr>
+              <a:t>Résultat benchmarking (10 threads)</a:t>
+            </a:r>
           </a:p>
         </p:txBody>
       </p:sp>
@@ -7872,21 +7860,8 @@
                   <a:schemeClr val="tx1"/>
                 </a:solidFill>
               </a:rPr>
-              <a:t>Résultat </a:t>
-            </a:r>
-            <a:r>
-              <a:rPr lang="fr-CH" sz="2800" dirty="0" smtClean="0">
-                <a:solidFill>
-                  <a:schemeClr val="tx1"/>
-                </a:solidFill>
-              </a:rPr>
-              <a:t>benchmarking (50 threads)</a:t>
-            </a:r>
-            <a:endParaRPr lang="fr-CH" sz="2800" dirty="0" smtClean="0">
-              <a:solidFill>
-                <a:schemeClr val="tx1"/>
-              </a:solidFill>
-            </a:endParaRPr>
+              <a:t>Résultat benchmarking (50 threads)</a:t>
+            </a:r>
           </a:p>
         </p:txBody>
       </p:sp>
@@ -8526,21 +8501,8 @@
                   <a:schemeClr val="tx1"/>
                 </a:solidFill>
               </a:rPr>
-              <a:t>Résultat </a:t>
-            </a:r>
-            <a:r>
-              <a:rPr lang="fr-CH" sz="2800" dirty="0" smtClean="0">
-                <a:solidFill>
-                  <a:schemeClr val="tx1"/>
-                </a:solidFill>
-              </a:rPr>
-              <a:t>benchmarking (100 threads)</a:t>
-            </a:r>
-            <a:endParaRPr lang="fr-CH" sz="2800" dirty="0" smtClean="0">
-              <a:solidFill>
-                <a:schemeClr val="tx1"/>
-              </a:solidFill>
-            </a:endParaRPr>
+              <a:t>Résultat benchmarking (100 threads)</a:t>
+            </a:r>
           </a:p>
         </p:txBody>
       </p:sp>
@@ -9152,6 +9114,95 @@
           <a:chExt cx="0" cy="0"/>
         </a:xfrm>
       </p:grpSpPr>
+      <p:pic>
+        <p:nvPicPr>
+          <p:cNvPr id="6" name="Image 5" descr="GraphiquePerformances.png"/>
+          <p:cNvPicPr>
+            <a:picLocks noChangeAspect="1"/>
+          </p:cNvPicPr>
+          <p:nvPr/>
+        </p:nvPicPr>
+        <p:blipFill>
+          <a:blip r:embed="rId2">
+            <a:extLst>
+              <a:ext uri="{28A0092B-C50C-407E-A947-70E740481C1C}">
+                <a14:useLocalDpi xmlns:a14="http://schemas.microsoft.com/office/drawing/2010/main" val="0"/>
+              </a:ext>
+            </a:extLst>
+          </a:blip>
+          <a:stretch>
+            <a:fillRect/>
+          </a:stretch>
+        </p:blipFill>
+        <p:spPr>
+          <a:xfrm>
+            <a:off x="210730" y="199614"/>
+            <a:ext cx="8499976" cy="6371646"/>
+          </a:xfrm>
+          <a:prstGeom prst="rect">
+            <a:avLst/>
+          </a:prstGeom>
+        </p:spPr>
+      </p:pic>
+      <p:sp>
+        <p:nvSpPr>
+          <p:cNvPr id="7" name="Espace réservé du numéro de diapositive 4"/>
+          <p:cNvSpPr>
+            <a:spLocks noGrp="1"/>
+          </p:cNvSpPr>
+          <p:nvPr>
+            <p:ph type="sldNum" sz="quarter" idx="12"/>
+          </p:nvPr>
+        </p:nvSpPr>
+        <p:spPr>
+          <a:xfrm>
+            <a:off x="10363200" y="5578475"/>
+            <a:ext cx="1142245" cy="669925"/>
+          </a:xfrm>
+        </p:spPr>
+        <p:txBody>
+          <a:bodyPr/>
+          <a:lstStyle/>
+          <a:p>
+            <a:fld id="{D57F1E4F-1CFF-5643-939E-217C01CDF565}" type="slidenum">
+              <a:rPr lang="en-US" smtClean="0"/>
+              <a:pPr/>
+              <a:t>13</a:t>
+            </a:fld>
+            <a:endParaRPr lang="en-US" dirty="0"/>
+          </a:p>
+        </p:txBody>
+      </p:sp>
+    </p:spTree>
+    <p:extLst>
+      <p:ext uri="{BB962C8B-B14F-4D97-AF65-F5344CB8AC3E}">
+        <p14:creationId xmlns:p14="http://schemas.microsoft.com/office/powerpoint/2010/main" val="3270637899"/>
+      </p:ext>
+    </p:extLst>
+  </p:cSld>
+  <p:clrMapOvr>
+    <a:masterClrMapping/>
+  </p:clrMapOvr>
+</p:sld>
+</file>
+
+<file path=ppt/slides/slide14.xml><?xml version="1.0" encoding="utf-8"?>
+<p:sld xmlns:a="http://schemas.openxmlformats.org/drawingml/2006/main" xmlns:r="http://schemas.openxmlformats.org/officeDocument/2006/relationships" xmlns:p="http://schemas.openxmlformats.org/presentationml/2006/main">
+  <p:cSld>
+    <p:spTree>
+      <p:nvGrpSpPr>
+        <p:cNvPr id="1" name=""/>
+        <p:cNvGrpSpPr/>
+        <p:nvPr/>
+      </p:nvGrpSpPr>
+      <p:grpSpPr>
+        <a:xfrm>
+          <a:off x="0" y="0"/>
+          <a:ext cx="0" cy="0"/>
+          <a:chOff x="0" y="0"/>
+          <a:chExt cx="0" cy="0"/>
+        </a:xfrm>
+      </p:grpSpPr>
       <p:sp>
         <p:nvSpPr>
           <p:cNvPr id="3" name="Espace réservé du contenu 2"/>
@@ -9203,7 +9254,7 @@
             <a:fld id="{D57F1E4F-1CFF-5643-939E-217C01CDF565}" type="slidenum">
               <a:rPr lang="en-US" smtClean="0"/>
               <a:pPr/>
-              <a:t>13</a:t>
+              <a:t>14</a:t>
             </a:fld>
             <a:endParaRPr lang="en-US" dirty="0"/>
           </a:p>
@@ -9465,15 +9516,7 @@
                   <a:schemeClr val="tx1"/>
                 </a:solidFill>
               </a:rPr>
-              <a:t>1 </a:t>
-            </a:r>
-            <a:r>
-              <a:rPr lang="fr-CH" sz="2000" dirty="0" smtClean="0">
-                <a:solidFill>
-                  <a:schemeClr val="tx1"/>
-                </a:solidFill>
-              </a:rPr>
-              <a:t>serveur </a:t>
+              <a:t>1 serveur </a:t>
             </a:r>
             <a:r>
               <a:rPr lang="fr-CH" sz="2000" dirty="0">
@@ -11285,7 +11328,7 @@
   <a:extraClrSchemeLst/>
   <a:extLst>
     <a:ext uri="{05A4C25C-085E-4340-85A3-A5531E510DB2}">
-      <thm15:themeFamily xmlns:thm15="http://schemas.microsoft.com/office/thememl/2012/main" xmlns="" name="Slice" id="{0507925B-6AC9-4358-8E18-C330545D08F8}" vid="{13FEC7C6-62A9-40C4-99D2-581AACACAA2F}"/>
+      <thm15:themeFamily xmlns="" xmlns:thm15="http://schemas.microsoft.com/office/thememl/2012/main" name="Slice" id="{0507925B-6AC9-4358-8E18-C330545D08F8}" vid="{13FEC7C6-62A9-40C4-99D2-581AACACAA2F}"/>
     </a:ext>
   </a:extLst>
 </a:theme>
@@ -11546,7 +11589,7 @@
   <a:extraClrSchemeLst/>
   <a:extLst>
     <a:ext uri="{05A4C25C-085E-4340-85A3-A5531E510DB2}">
-      <thm15:themeFamily xmlns:thm15="http://schemas.microsoft.com/office/thememl/2012/main" xmlns="" name="Office Theme" id="{62F939B6-93AF-4DB8-9C6B-D6C7DFDC589F}" vid="{4A3C46E8-61CC-4603-A589-7422A47A8E4A}"/>
+      <thm15:themeFamily xmlns="" xmlns:thm15="http://schemas.microsoft.com/office/thememl/2012/main" name="Office Theme" id="{62F939B6-93AF-4DB8-9C6B-D6C7DFDC589F}" vid="{4A3C46E8-61CC-4603-A589-7422A47A8E4A}"/>
     </a:ext>
   </a:extLst>
 </a:theme>

</xml_diff>

<commit_message>
Ajout slide prob rencontrés et java ee vs play session management
</commit_message>
<xml_diff>
--- a/Presentation/Caching-Team1.pptx
+++ b/Presentation/Caching-Team1.pptx
@@ -5,7 +5,7 @@
     <p:sldMasterId id="2147483669" r:id="rId1"/>
   </p:sldMasterIdLst>
   <p:notesMasterIdLst>
-    <p:notesMasterId r:id="rId16"/>
+    <p:notesMasterId r:id="rId18"/>
   </p:notesMasterIdLst>
   <p:sldIdLst>
     <p:sldId id="256" r:id="rId2"/>
@@ -21,7 +21,9 @@
     <p:sldId id="273" r:id="rId12"/>
     <p:sldId id="274" r:id="rId13"/>
     <p:sldId id="275" r:id="rId14"/>
-    <p:sldId id="271" r:id="rId15"/>
+    <p:sldId id="276" r:id="rId15"/>
+    <p:sldId id="271" r:id="rId16"/>
+    <p:sldId id="277" r:id="rId17"/>
   </p:sldIdLst>
   <p:sldSz cx="12192000" cy="6858000"/>
   <p:notesSz cx="6858000" cy="9144000"/>
@@ -122,7 +124,18 @@
   </p:defaultTextStyle>
   <p:extLst>
     <p:ext uri="{EFAFB233-063F-42B5-8137-9DF3F51BA10A}">
-      <p15:sldGuideLst xmlns="" xmlns:p15="http://schemas.microsoft.com/office/powerpoint/2012/main"/>
+      <p15:sldGuideLst xmlns:p15="http://schemas.microsoft.com/office/powerpoint/2012/main">
+        <p15:guide id="1" orient="horz" pos="2160">
+          <p15:clr>
+            <a:srgbClr val="A4A3A4"/>
+          </p15:clr>
+        </p15:guide>
+        <p15:guide id="2" pos="3840">
+          <p15:clr>
+            <a:srgbClr val="A4A3A4"/>
+          </p15:clr>
+        </p15:guide>
+      </p15:sldGuideLst>
     </p:ext>
   </p:extLst>
 </p:presentation>
@@ -210,7 +223,7 @@
           <a:p>
             <a:fld id="{45C3BB5B-89FE-4146-B4B5-AC9351EE7F5C}" type="datetimeFigureOut">
               <a:rPr lang="fr-CH" smtClean="0"/>
-              <a:t>05.01.14</a:t>
+              <a:t>05.01.2014</a:t>
             </a:fld>
             <a:endParaRPr lang="fr-CH"/>
           </a:p>
@@ -369,7 +382,7 @@
           <a:p>
             <a:fld id="{6A60D253-495A-493B-97BB-B92F1FA596BA}" type="slidenum">
               <a:rPr lang="fr-CH" smtClean="0"/>
-              <a:t>‹#›</a:t>
+              <a:t>‹N°›</a:t>
             </a:fld>
             <a:endParaRPr lang="fr-CH"/>
           </a:p>
@@ -888,7 +901,175 @@
     </p:spTree>
     <p:extLst>
       <p:ext uri="{BB962C8B-B14F-4D97-AF65-F5344CB8AC3E}">
+        <p14:creationId xmlns:p14="http://schemas.microsoft.com/office/powerpoint/2010/main" val="1015830192"/>
+      </p:ext>
+    </p:extLst>
+  </p:cSld>
+  <p:clrMapOvr>
+    <a:masterClrMapping/>
+  </p:clrMapOvr>
+</p:notes>
+</file>
+
+<file path=ppt/notesSlides/notesSlide14.xml><?xml version="1.0" encoding="utf-8"?>
+<p:notes xmlns:a="http://schemas.openxmlformats.org/drawingml/2006/main" xmlns:r="http://schemas.openxmlformats.org/officeDocument/2006/relationships" xmlns:p="http://schemas.openxmlformats.org/presentationml/2006/main">
+  <p:cSld>
+    <p:spTree>
+      <p:nvGrpSpPr>
+        <p:cNvPr id="1" name=""/>
+        <p:cNvGrpSpPr/>
+        <p:nvPr/>
+      </p:nvGrpSpPr>
+      <p:grpSpPr>
+        <a:xfrm>
+          <a:off x="0" y="0"/>
+          <a:ext cx="0" cy="0"/>
+          <a:chOff x="0" y="0"/>
+          <a:chExt cx="0" cy="0"/>
+        </a:xfrm>
+      </p:grpSpPr>
+      <p:sp>
+        <p:nvSpPr>
+          <p:cNvPr id="2" name="Espace réservé de l'image des diapositives 1"/>
+          <p:cNvSpPr>
+            <a:spLocks noGrp="1" noRot="1" noChangeAspect="1"/>
+          </p:cNvSpPr>
+          <p:nvPr>
+            <p:ph type="sldImg"/>
+          </p:nvPr>
+        </p:nvSpPr>
+        <p:spPr/>
+      </p:sp>
+      <p:sp>
+        <p:nvSpPr>
+          <p:cNvPr id="3" name="Espace réservé des commentaires 2"/>
+          <p:cNvSpPr>
+            <a:spLocks noGrp="1"/>
+          </p:cNvSpPr>
+          <p:nvPr>
+            <p:ph type="body" idx="1"/>
+          </p:nvPr>
+        </p:nvSpPr>
+        <p:spPr/>
+        <p:txBody>
+          <a:bodyPr/>
+          <a:lstStyle/>
+          <a:p>
+            <a:endParaRPr lang="fr-CH" dirty="0"/>
+          </a:p>
+        </p:txBody>
+      </p:sp>
+      <p:sp>
+        <p:nvSpPr>
+          <p:cNvPr id="4" name="Espace réservé du numéro de diapositive 3"/>
+          <p:cNvSpPr>
+            <a:spLocks noGrp="1"/>
+          </p:cNvSpPr>
+          <p:nvPr>
+            <p:ph type="sldNum" sz="quarter" idx="10"/>
+          </p:nvPr>
+        </p:nvSpPr>
+        <p:spPr/>
+        <p:txBody>
+          <a:bodyPr/>
+          <a:lstStyle/>
+          <a:p>
+            <a:fld id="{6A60D253-495A-493B-97BB-B92F1FA596BA}" type="slidenum">
+              <a:rPr lang="fr-CH" smtClean="0"/>
+              <a:t>15</a:t>
+            </a:fld>
+            <a:endParaRPr lang="fr-CH"/>
+          </a:p>
+        </p:txBody>
+      </p:sp>
+    </p:spTree>
+    <p:extLst>
+      <p:ext uri="{BB962C8B-B14F-4D97-AF65-F5344CB8AC3E}">
         <p14:creationId xmlns:p14="http://schemas.microsoft.com/office/powerpoint/2010/main" val="1936630999"/>
+      </p:ext>
+    </p:extLst>
+  </p:cSld>
+  <p:clrMapOvr>
+    <a:masterClrMapping/>
+  </p:clrMapOvr>
+</p:notes>
+</file>
+
+<file path=ppt/notesSlides/notesSlide15.xml><?xml version="1.0" encoding="utf-8"?>
+<p:notes xmlns:a="http://schemas.openxmlformats.org/drawingml/2006/main" xmlns:r="http://schemas.openxmlformats.org/officeDocument/2006/relationships" xmlns:p="http://schemas.openxmlformats.org/presentationml/2006/main">
+  <p:cSld>
+    <p:spTree>
+      <p:nvGrpSpPr>
+        <p:cNvPr id="1" name=""/>
+        <p:cNvGrpSpPr/>
+        <p:nvPr/>
+      </p:nvGrpSpPr>
+      <p:grpSpPr>
+        <a:xfrm>
+          <a:off x="0" y="0"/>
+          <a:ext cx="0" cy="0"/>
+          <a:chOff x="0" y="0"/>
+          <a:chExt cx="0" cy="0"/>
+        </a:xfrm>
+      </p:grpSpPr>
+      <p:sp>
+        <p:nvSpPr>
+          <p:cNvPr id="2" name="Espace réservé de l'image des diapositives 1"/>
+          <p:cNvSpPr>
+            <a:spLocks noGrp="1" noRot="1" noChangeAspect="1"/>
+          </p:cNvSpPr>
+          <p:nvPr>
+            <p:ph type="sldImg"/>
+          </p:nvPr>
+        </p:nvSpPr>
+        <p:spPr/>
+      </p:sp>
+      <p:sp>
+        <p:nvSpPr>
+          <p:cNvPr id="3" name="Espace réservé des commentaires 2"/>
+          <p:cNvSpPr>
+            <a:spLocks noGrp="1"/>
+          </p:cNvSpPr>
+          <p:nvPr>
+            <p:ph type="body" idx="1"/>
+          </p:nvPr>
+        </p:nvSpPr>
+        <p:spPr/>
+        <p:txBody>
+          <a:bodyPr/>
+          <a:lstStyle/>
+          <a:p>
+            <a:endParaRPr lang="fr-CH" dirty="0"/>
+          </a:p>
+        </p:txBody>
+      </p:sp>
+      <p:sp>
+        <p:nvSpPr>
+          <p:cNvPr id="4" name="Espace réservé du numéro de diapositive 3"/>
+          <p:cNvSpPr>
+            <a:spLocks noGrp="1"/>
+          </p:cNvSpPr>
+          <p:nvPr>
+            <p:ph type="sldNum" sz="quarter" idx="10"/>
+          </p:nvPr>
+        </p:nvSpPr>
+        <p:spPr/>
+        <p:txBody>
+          <a:bodyPr/>
+          <a:lstStyle/>
+          <a:p>
+            <a:fld id="{6A60D253-495A-493B-97BB-B92F1FA596BA}" type="slidenum">
+              <a:rPr lang="fr-CH" smtClean="0"/>
+              <a:t>16</a:t>
+            </a:fld>
+            <a:endParaRPr lang="fr-CH"/>
+          </a:p>
+        </p:txBody>
+      </p:sp>
+    </p:spTree>
+    <p:extLst>
+      <p:ext uri="{BB962C8B-B14F-4D97-AF65-F5344CB8AC3E}">
+        <p14:creationId xmlns:p14="http://schemas.microsoft.com/office/powerpoint/2010/main" val="964767321"/>
       </p:ext>
     </p:extLst>
   </p:cSld>
@@ -1762,7 +1943,7 @@
             <a:fld id="{B61BEF0D-F0BB-DE4B-95CE-6DB70DBA9567}" type="datetimeFigureOut">
               <a:rPr lang="en-US" smtClean="0"/>
               <a:pPr/>
-              <a:t>05.01.14</a:t>
+              <a:t>1/5/2014</a:t>
             </a:fld>
             <a:endParaRPr lang="en-US" dirty="0"/>
           </a:p>
@@ -1805,7 +1986,7 @@
             <a:fld id="{D57F1E4F-1CFF-5643-939E-217C01CDF565}" type="slidenum">
               <a:rPr lang="en-US" smtClean="0"/>
               <a:pPr/>
-              <a:t>‹#›</a:t>
+              <a:t>‹N°›</a:t>
             </a:fld>
             <a:endParaRPr lang="en-US" dirty="0"/>
           </a:p>
@@ -2200,7 +2381,7 @@
             <a:fld id="{B61BEF0D-F0BB-DE4B-95CE-6DB70DBA9567}" type="datetimeFigureOut">
               <a:rPr lang="en-US" smtClean="0"/>
               <a:pPr/>
-              <a:t>05.01.14</a:t>
+              <a:t>1/5/2014</a:t>
             </a:fld>
             <a:endParaRPr lang="en-US" dirty="0"/>
           </a:p>
@@ -2243,7 +2424,7 @@
             <a:fld id="{D57F1E4F-1CFF-5643-939E-217C01CDF565}" type="slidenum">
               <a:rPr lang="en-US" smtClean="0"/>
               <a:pPr/>
-              <a:t>‹#›</a:t>
+              <a:t>‹N°›</a:t>
             </a:fld>
             <a:endParaRPr lang="en-US" dirty="0"/>
           </a:p>
@@ -2452,7 +2633,7 @@
             <a:fld id="{B61BEF0D-F0BB-DE4B-95CE-6DB70DBA9567}" type="datetimeFigureOut">
               <a:rPr lang="en-US" smtClean="0"/>
               <a:pPr/>
-              <a:t>05.01.14</a:t>
+              <a:t>1/5/2014</a:t>
             </a:fld>
             <a:endParaRPr lang="en-US" dirty="0"/>
           </a:p>
@@ -2495,7 +2676,7 @@
             <a:fld id="{D57F1E4F-1CFF-5643-939E-217C01CDF565}" type="slidenum">
               <a:rPr lang="en-US" smtClean="0"/>
               <a:pPr/>
-              <a:t>‹#›</a:t>
+              <a:t>‹N°›</a:t>
             </a:fld>
             <a:endParaRPr lang="en-US" dirty="0"/>
           </a:p>
@@ -2762,7 +2943,7 @@
             <a:fld id="{B61BEF0D-F0BB-DE4B-95CE-6DB70DBA9567}" type="datetimeFigureOut">
               <a:rPr lang="en-US" smtClean="0"/>
               <a:pPr/>
-              <a:t>05.01.14</a:t>
+              <a:t>1/5/2014</a:t>
             </a:fld>
             <a:endParaRPr lang="en-US" dirty="0"/>
           </a:p>
@@ -2805,7 +2986,7 @@
             <a:fld id="{D57F1E4F-1CFF-5643-939E-217C01CDF565}" type="slidenum">
               <a:rPr lang="en-US" smtClean="0"/>
               <a:pPr/>
-              <a:t>‹#›</a:t>
+              <a:t>‹N°›</a:t>
             </a:fld>
             <a:endParaRPr lang="en-US" dirty="0"/>
           </a:p>
@@ -3082,7 +3263,7 @@
             <a:fld id="{B61BEF0D-F0BB-DE4B-95CE-6DB70DBA9567}" type="datetimeFigureOut">
               <a:rPr lang="en-US" smtClean="0"/>
               <a:pPr/>
-              <a:t>05.01.14</a:t>
+              <a:t>1/5/2014</a:t>
             </a:fld>
             <a:endParaRPr lang="en-US" dirty="0"/>
           </a:p>
@@ -3125,7 +3306,7 @@
             <a:fld id="{D57F1E4F-1CFF-5643-939E-217C01CDF565}" type="slidenum">
               <a:rPr lang="en-US" smtClean="0"/>
               <a:pPr/>
-              <a:t>‹#›</a:t>
+              <a:t>‹N°›</a:t>
             </a:fld>
             <a:endParaRPr lang="en-US" dirty="0"/>
           </a:p>
@@ -3386,7 +3567,7 @@
             <a:fld id="{B61BEF0D-F0BB-DE4B-95CE-6DB70DBA9567}" type="datetimeFigureOut">
               <a:rPr lang="en-US" smtClean="0"/>
               <a:pPr/>
-              <a:t>05.01.14</a:t>
+              <a:t>1/5/2014</a:t>
             </a:fld>
             <a:endParaRPr lang="en-US" dirty="0"/>
           </a:p>
@@ -3429,7 +3610,7 @@
             <a:fld id="{D57F1E4F-1CFF-5643-939E-217C01CDF565}" type="slidenum">
               <a:rPr lang="en-US" smtClean="0"/>
               <a:pPr/>
-              <a:t>‹#›</a:t>
+              <a:t>‹N°›</a:t>
             </a:fld>
             <a:endParaRPr lang="en-US" dirty="0"/>
           </a:p>
@@ -3755,7 +3936,7 @@
             <a:fld id="{B61BEF0D-F0BB-DE4B-95CE-6DB70DBA9567}" type="datetimeFigureOut">
               <a:rPr lang="en-US" smtClean="0"/>
               <a:pPr/>
-              <a:t>05.01.14</a:t>
+              <a:t>1/5/2014</a:t>
             </a:fld>
             <a:endParaRPr lang="en-US" dirty="0"/>
           </a:p>
@@ -3798,7 +3979,7 @@
             <a:fld id="{D57F1E4F-1CFF-5643-939E-217C01CDF565}" type="slidenum">
               <a:rPr lang="en-US" smtClean="0"/>
               <a:pPr/>
-              <a:t>‹#›</a:t>
+              <a:t>‹N°›</a:t>
             </a:fld>
             <a:endParaRPr lang="en-US" dirty="0"/>
           </a:p>
@@ -3931,7 +4112,7 @@
             <a:fld id="{B61BEF0D-F0BB-DE4B-95CE-6DB70DBA9567}" type="datetimeFigureOut">
               <a:rPr lang="en-US" smtClean="0"/>
               <a:pPr/>
-              <a:t>05.01.14</a:t>
+              <a:t>1/5/2014</a:t>
             </a:fld>
             <a:endParaRPr lang="en-US" dirty="0"/>
           </a:p>
@@ -3974,7 +4155,7 @@
             <a:fld id="{D57F1E4F-1CFF-5643-939E-217C01CDF565}" type="slidenum">
               <a:rPr lang="en-US" smtClean="0"/>
               <a:pPr/>
-              <a:t>‹#›</a:t>
+              <a:t>‹N°›</a:t>
             </a:fld>
             <a:endParaRPr lang="en-US" dirty="0"/>
           </a:p>
@@ -4113,7 +4294,7 @@
             <a:fld id="{B61BEF0D-F0BB-DE4B-95CE-6DB70DBA9567}" type="datetimeFigureOut">
               <a:rPr lang="en-US" smtClean="0"/>
               <a:pPr/>
-              <a:t>05.01.14</a:t>
+              <a:t>1/5/2014</a:t>
             </a:fld>
             <a:endParaRPr lang="en-US" dirty="0"/>
           </a:p>
@@ -4156,7 +4337,7 @@
             <a:fld id="{D57F1E4F-1CFF-5643-939E-217C01CDF565}" type="slidenum">
               <a:rPr lang="en-US" smtClean="0"/>
               <a:pPr/>
-              <a:t>‹#›</a:t>
+              <a:t>‹N°›</a:t>
             </a:fld>
             <a:endParaRPr lang="en-US" dirty="0"/>
           </a:p>
@@ -4285,7 +4466,7 @@
             <a:fld id="{B61BEF0D-F0BB-DE4B-95CE-6DB70DBA9567}" type="datetimeFigureOut">
               <a:rPr lang="en-US" smtClean="0"/>
               <a:pPr/>
-              <a:t>05.01.14</a:t>
+              <a:t>1/5/2014</a:t>
             </a:fld>
             <a:endParaRPr lang="en-US" dirty="0"/>
           </a:p>
@@ -4328,7 +4509,7 @@
             <a:fld id="{D57F1E4F-1CFF-5643-939E-217C01CDF565}" type="slidenum">
               <a:rPr lang="en-US" smtClean="0"/>
               <a:pPr/>
-              <a:t>‹#›</a:t>
+              <a:t>‹N°›</a:t>
             </a:fld>
             <a:endParaRPr lang="en-US" dirty="0"/>
           </a:p>
@@ -4537,7 +4718,7 @@
             <a:fld id="{B61BEF0D-F0BB-DE4B-95CE-6DB70DBA9567}" type="datetimeFigureOut">
               <a:rPr lang="en-US" smtClean="0"/>
               <a:pPr/>
-              <a:t>05.01.14</a:t>
+              <a:t>1/5/2014</a:t>
             </a:fld>
             <a:endParaRPr lang="en-US" dirty="0"/>
           </a:p>
@@ -4580,7 +4761,7 @@
             <a:fld id="{D57F1E4F-1CFF-5643-939E-217C01CDF565}" type="slidenum">
               <a:rPr lang="en-US" smtClean="0"/>
               <a:pPr/>
-              <a:t>‹#›</a:t>
+              <a:t>‹N°›</a:t>
             </a:fld>
             <a:endParaRPr lang="en-US" dirty="0"/>
           </a:p>
@@ -4775,7 +4956,7 @@
             <a:fld id="{B61BEF0D-F0BB-DE4B-95CE-6DB70DBA9567}" type="datetimeFigureOut">
               <a:rPr lang="en-US" smtClean="0"/>
               <a:pPr/>
-              <a:t>05.01.14</a:t>
+              <a:t>1/5/2014</a:t>
             </a:fld>
             <a:endParaRPr lang="en-US" dirty="0"/>
           </a:p>
@@ -4818,7 +4999,7 @@
             <a:fld id="{D57F1E4F-1CFF-5643-939E-217C01CDF565}" type="slidenum">
               <a:rPr lang="en-US" smtClean="0"/>
               <a:pPr/>
-              <a:t>‹#›</a:t>
+              <a:t>‹N°›</a:t>
             </a:fld>
             <a:endParaRPr lang="en-US" dirty="0"/>
           </a:p>
@@ -5159,7 +5340,7 @@
             <a:fld id="{B61BEF0D-F0BB-DE4B-95CE-6DB70DBA9567}" type="datetimeFigureOut">
               <a:rPr lang="en-US" smtClean="0"/>
               <a:pPr/>
-              <a:t>05.01.14</a:t>
+              <a:t>1/5/2014</a:t>
             </a:fld>
             <a:endParaRPr lang="en-US" dirty="0"/>
           </a:p>
@@ -5202,7 +5383,7 @@
             <a:fld id="{D57F1E4F-1CFF-5643-939E-217C01CDF565}" type="slidenum">
               <a:rPr lang="en-US" smtClean="0"/>
               <a:pPr/>
-              <a:t>‹#›</a:t>
+              <a:t>‹N°›</a:t>
             </a:fld>
             <a:endParaRPr lang="en-US" dirty="0"/>
           </a:p>
@@ -5279,7 +5460,7 @@
             <a:fld id="{B61BEF0D-F0BB-DE4B-95CE-6DB70DBA9567}" type="datetimeFigureOut">
               <a:rPr lang="en-US" smtClean="0"/>
               <a:pPr/>
-              <a:t>05.01.14</a:t>
+              <a:t>1/5/2014</a:t>
             </a:fld>
             <a:endParaRPr lang="en-US" dirty="0"/>
           </a:p>
@@ -5322,7 +5503,7 @@
             <a:fld id="{D57F1E4F-1CFF-5643-939E-217C01CDF565}" type="slidenum">
               <a:rPr lang="en-US" smtClean="0"/>
               <a:pPr/>
-              <a:t>‹#›</a:t>
+              <a:t>‹N°›</a:t>
             </a:fld>
             <a:endParaRPr lang="en-US" dirty="0"/>
           </a:p>
@@ -5376,7 +5557,7 @@
             <a:fld id="{B61BEF0D-F0BB-DE4B-95CE-6DB70DBA9567}" type="datetimeFigureOut">
               <a:rPr lang="en-US" smtClean="0"/>
               <a:pPr/>
-              <a:t>05.01.14</a:t>
+              <a:t>1/5/2014</a:t>
             </a:fld>
             <a:endParaRPr lang="en-US" dirty="0"/>
           </a:p>
@@ -5419,7 +5600,7 @@
             <a:fld id="{D57F1E4F-1CFF-5643-939E-217C01CDF565}" type="slidenum">
               <a:rPr lang="en-US" smtClean="0"/>
               <a:pPr/>
-              <a:t>‹#›</a:t>
+              <a:t>‹N°›</a:t>
             </a:fld>
             <a:endParaRPr lang="en-US" dirty="0"/>
           </a:p>
@@ -5633,7 +5814,7 @@
             <a:fld id="{B61BEF0D-F0BB-DE4B-95CE-6DB70DBA9567}" type="datetimeFigureOut">
               <a:rPr lang="en-US" smtClean="0"/>
               <a:pPr/>
-              <a:t>05.01.14</a:t>
+              <a:t>1/5/2014</a:t>
             </a:fld>
             <a:endParaRPr lang="en-US" dirty="0"/>
           </a:p>
@@ -5676,7 +5857,7 @@
             <a:fld id="{D57F1E4F-1CFF-5643-939E-217C01CDF565}" type="slidenum">
               <a:rPr lang="en-US" smtClean="0"/>
               <a:pPr/>
-              <a:t>‹#›</a:t>
+              <a:t>‹N°›</a:t>
             </a:fld>
             <a:endParaRPr lang="en-US" dirty="0"/>
           </a:p>
@@ -5918,7 +6099,7 @@
             <a:fld id="{B61BEF0D-F0BB-DE4B-95CE-6DB70DBA9567}" type="datetimeFigureOut">
               <a:rPr lang="en-US" smtClean="0"/>
               <a:pPr/>
-              <a:t>05.01.14</a:t>
+              <a:t>1/5/2014</a:t>
             </a:fld>
             <a:endParaRPr lang="en-US" dirty="0"/>
           </a:p>
@@ -5961,7 +6142,7 @@
             <a:fld id="{D57F1E4F-1CFF-5643-939E-217C01CDF565}" type="slidenum">
               <a:rPr lang="en-US" smtClean="0"/>
               <a:pPr/>
-              <a:t>‹#›</a:t>
+              <a:t>‹N°›</a:t>
             </a:fld>
             <a:endParaRPr lang="en-US" dirty="0"/>
           </a:p>
@@ -6326,7 +6507,7 @@
             <a:fld id="{B61BEF0D-F0BB-DE4B-95CE-6DB70DBA9567}" type="datetimeFigureOut">
               <a:rPr lang="en-US" smtClean="0"/>
               <a:pPr/>
-              <a:t>05.01.14</a:t>
+              <a:t>1/5/2014</a:t>
             </a:fld>
             <a:endParaRPr lang="en-US" dirty="0"/>
           </a:p>
@@ -6409,7 +6590,7 @@
             <a:fld id="{D57F1E4F-1CFF-5643-939E-217C01CDF565}" type="slidenum">
               <a:rPr lang="en-US" smtClean="0"/>
               <a:pPr/>
-              <a:t>‹#›</a:t>
+              <a:t>‹N°›</a:t>
             </a:fld>
             <a:endParaRPr lang="en-US" dirty="0"/>
           </a:p>
@@ -7146,7 +7327,7 @@
           <a:noFill/>
           <a:extLst>
             <a:ext uri="{909E8E84-426E-40dd-AFC4-6F175D3DCCD1}">
-              <a14:hiddenFill xmlns:a14="http://schemas.microsoft.com/office/drawing/2010/main">
+              <a14:hiddenFill xmlns:a14="http://schemas.microsoft.com/office/drawing/2010/main" xmlns="">
                 <a:solidFill>
                   <a:srgbClr val="FFFFFF"/>
                 </a:solidFill>
@@ -7168,7 +7349,7 @@
   <p:timing>
     <p:tnLst>
       <p:par>
-        <p:cTn xmlns:p14="http://schemas.microsoft.com/office/powerpoint/2010/main" id="1" dur="indefinite" restart="never" nodeType="tmRoot"/>
+        <p:cTn id="1" dur="indefinite" restart="never" nodeType="tmRoot"/>
       </p:par>
     </p:tnLst>
   </p:timing>
@@ -7220,8 +7401,21 @@
                   <a:schemeClr val="tx1"/>
                 </a:solidFill>
               </a:rPr>
-              <a:t>Résultat benchmarking (10 threads)</a:t>
-            </a:r>
+              <a:t>Résultat benchmarking (10 threads</a:t>
+            </a:r>
+            <a:r>
+              <a:rPr lang="fr-CH" sz="2800" dirty="0" smtClean="0">
+                <a:solidFill>
+                  <a:schemeClr val="tx1"/>
+                </a:solidFill>
+              </a:rPr>
+              <a:t>) [ms]</a:t>
+            </a:r>
+            <a:endParaRPr lang="fr-CH" sz="2800" dirty="0" smtClean="0">
+              <a:solidFill>
+                <a:schemeClr val="tx1"/>
+              </a:solidFill>
+            </a:endParaRPr>
           </a:p>
         </p:txBody>
       </p:sp>
@@ -7808,7 +8002,7 @@
   <p:timing>
     <p:tnLst>
       <p:par>
-        <p:cTn xmlns:p14="http://schemas.microsoft.com/office/powerpoint/2010/main" id="1" dur="indefinite" restart="never" nodeType="tmRoot"/>
+        <p:cTn id="1" dur="indefinite" restart="never" nodeType="tmRoot"/>
       </p:par>
     </p:tnLst>
   </p:timing>
@@ -7860,8 +8054,21 @@
                   <a:schemeClr val="tx1"/>
                 </a:solidFill>
               </a:rPr>
-              <a:t>Résultat benchmarking (50 threads)</a:t>
-            </a:r>
+              <a:t>Résultat benchmarking (50 threads</a:t>
+            </a:r>
+            <a:r>
+              <a:rPr lang="fr-CH" sz="2800" dirty="0" smtClean="0">
+                <a:solidFill>
+                  <a:schemeClr val="tx1"/>
+                </a:solidFill>
+              </a:rPr>
+              <a:t>) [ms]</a:t>
+            </a:r>
+            <a:endParaRPr lang="fr-CH" sz="2800" dirty="0" smtClean="0">
+              <a:solidFill>
+                <a:schemeClr val="tx1"/>
+              </a:solidFill>
+            </a:endParaRPr>
           </a:p>
         </p:txBody>
       </p:sp>
@@ -8449,7 +8656,7 @@
   <p:timing>
     <p:tnLst>
       <p:par>
-        <p:cTn xmlns:p14="http://schemas.microsoft.com/office/powerpoint/2010/main" id="1" dur="indefinite" restart="never" nodeType="tmRoot"/>
+        <p:cTn id="1" dur="indefinite" restart="never" nodeType="tmRoot"/>
       </p:par>
     </p:tnLst>
   </p:timing>
@@ -8501,8 +8708,21 @@
                   <a:schemeClr val="tx1"/>
                 </a:solidFill>
               </a:rPr>
-              <a:t>Résultat benchmarking (100 threads)</a:t>
-            </a:r>
+              <a:t>Résultat benchmarking (100 threads</a:t>
+            </a:r>
+            <a:r>
+              <a:rPr lang="fr-CH" sz="2800" dirty="0" smtClean="0">
+                <a:solidFill>
+                  <a:schemeClr val="tx1"/>
+                </a:solidFill>
+              </a:rPr>
+              <a:t>) [ms]</a:t>
+            </a:r>
+            <a:endParaRPr lang="fr-CH" sz="2800" dirty="0" smtClean="0">
+              <a:solidFill>
+                <a:schemeClr val="tx1"/>
+              </a:solidFill>
+            </a:endParaRPr>
           </a:p>
         </p:txBody>
       </p:sp>
@@ -9090,7 +9310,7 @@
   <p:timing>
     <p:tnLst>
       <p:par>
-        <p:cTn xmlns:p14="http://schemas.microsoft.com/office/powerpoint/2010/main" id="1" dur="indefinite" restart="never" nodeType="tmRoot"/>
+        <p:cTn id="1" dur="indefinite" restart="never" nodeType="tmRoot"/>
       </p:par>
     </p:tnLst>
   </p:timing>
@@ -9136,7 +9356,7 @@
         </p:blipFill>
         <p:spPr>
           <a:xfrm>
-            <a:off x="210730" y="199614"/>
+            <a:off x="706030" y="199614"/>
             <a:ext cx="8499976" cy="6371646"/>
           </a:xfrm>
           <a:prstGeom prst="rect">
@@ -9215,8 +9435,8 @@
         </p:nvSpPr>
         <p:spPr>
           <a:xfrm>
-            <a:off x="684212" y="685801"/>
-            <a:ext cx="8534400" cy="1993900"/>
+            <a:off x="684212" y="685800"/>
+            <a:ext cx="8534400" cy="5803900"/>
           </a:xfrm>
         </p:spPr>
         <p:txBody>
@@ -9225,13 +9445,215 @@
           </a:bodyPr>
           <a:lstStyle/>
           <a:p>
-            <a:r>
-              <a:rPr lang="fr-CH" sz="2800" dirty="0" smtClean="0">
-                <a:solidFill>
-                  <a:schemeClr val="tx1"/>
-                </a:solidFill>
-              </a:rPr>
-              <a:t>Question ?</a:t>
+            <a:pPr lvl="1"/>
+            <a:r>
+              <a:rPr lang="en-US" sz="2600" dirty="0" smtClean="0">
+                <a:solidFill>
+                  <a:schemeClr val="tx1"/>
+                </a:solidFill>
+              </a:rPr>
+              <a:t>Play vs Java EE approaches </a:t>
+            </a:r>
+            <a:r>
+              <a:rPr lang="en-US" sz="2600" dirty="0">
+                <a:solidFill>
+                  <a:schemeClr val="tx1"/>
+                </a:solidFill>
+              </a:rPr>
+              <a:t>HTTP session state management and how it </a:t>
+            </a:r>
+            <a:r>
+              <a:rPr lang="en-US" sz="2600" dirty="0" smtClean="0">
+                <a:solidFill>
+                  <a:schemeClr val="tx1"/>
+                </a:solidFill>
+              </a:rPr>
+              <a:t>is different </a:t>
+            </a:r>
+            <a:r>
+              <a:rPr lang="en-US" sz="2600" dirty="0">
+                <a:solidFill>
+                  <a:schemeClr val="tx1"/>
+                </a:solidFill>
+              </a:rPr>
+              <a:t>from the traditional Java EE approach. </a:t>
+            </a:r>
+          </a:p>
+          <a:p>
+            <a:pPr lvl="2"/>
+            <a:r>
+              <a:rPr lang="fr-CH" sz="2400" b="1" dirty="0">
+                <a:solidFill>
+                  <a:schemeClr val="tx1"/>
+                </a:solidFill>
+              </a:rPr>
+              <a:t>Play</a:t>
+            </a:r>
+            <a:r>
+              <a:rPr lang="fr-CH" sz="2400" dirty="0">
+                <a:solidFill>
+                  <a:schemeClr val="tx1"/>
+                </a:solidFill>
+              </a:rPr>
+              <a:t> </a:t>
+            </a:r>
+            <a:r>
+              <a:rPr lang="fr-CH" sz="2400" dirty="0" smtClean="0">
+                <a:solidFill>
+                  <a:schemeClr val="tx1"/>
+                </a:solidFill>
+              </a:rPr>
+              <a:t>stocke les </a:t>
+            </a:r>
+            <a:r>
+              <a:rPr lang="fr-CH" sz="2400" b="1" dirty="0" smtClean="0">
+                <a:solidFill>
+                  <a:schemeClr val="tx1"/>
+                </a:solidFill>
+              </a:rPr>
+              <a:t>données </a:t>
+            </a:r>
+            <a:r>
+              <a:rPr lang="fr-CH" sz="2400" b="1" dirty="0">
+                <a:solidFill>
+                  <a:schemeClr val="tx1"/>
+                </a:solidFill>
+              </a:rPr>
+              <a:t>de session </a:t>
+            </a:r>
+            <a:r>
+              <a:rPr lang="fr-CH" sz="2400" dirty="0">
+                <a:solidFill>
+                  <a:schemeClr val="tx1"/>
+                </a:solidFill>
+              </a:rPr>
+              <a:t>dans le </a:t>
+            </a:r>
+            <a:r>
+              <a:rPr lang="fr-CH" sz="2400" b="1" dirty="0">
+                <a:solidFill>
+                  <a:schemeClr val="tx1"/>
+                </a:solidFill>
+              </a:rPr>
+              <a:t>cookie</a:t>
+            </a:r>
+            <a:r>
+              <a:rPr lang="fr-CH" sz="2400" dirty="0">
+                <a:solidFill>
+                  <a:schemeClr val="tx1"/>
+                </a:solidFill>
+              </a:rPr>
+              <a:t> de la prochaine requête </a:t>
+            </a:r>
+            <a:r>
+              <a:rPr lang="fr-CH" sz="2400" dirty="0" smtClean="0">
+                <a:solidFill>
+                  <a:schemeClr val="tx1"/>
+                </a:solidFill>
+              </a:rPr>
+              <a:t>HTTP. Le cookie est chiffré</a:t>
+            </a:r>
+          </a:p>
+          <a:p>
+            <a:pPr lvl="2"/>
+            <a:r>
+              <a:rPr lang="fr-CH" sz="2400" b="1" dirty="0">
+                <a:solidFill>
+                  <a:schemeClr val="tx1"/>
+                </a:solidFill>
+              </a:rPr>
+              <a:t>Java EE </a:t>
+            </a:r>
+            <a:r>
+              <a:rPr lang="fr-CH" sz="2400" dirty="0" smtClean="0">
+                <a:solidFill>
+                  <a:schemeClr val="tx1"/>
+                </a:solidFill>
+              </a:rPr>
+              <a:t>met a disposition des conteneur </a:t>
+            </a:r>
+            <a:r>
+              <a:rPr lang="fr-CH" sz="2400" b="1" dirty="0">
+                <a:solidFill>
+                  <a:schemeClr val="tx1"/>
+                </a:solidFill>
+              </a:rPr>
+              <a:t>EJB </a:t>
+            </a:r>
+            <a:r>
+              <a:rPr lang="fr-CH" sz="2400" b="1" dirty="0" err="1">
+                <a:solidFill>
+                  <a:schemeClr val="tx1"/>
+                </a:solidFill>
+              </a:rPr>
+              <a:t>stateful</a:t>
+            </a:r>
+            <a:r>
+              <a:rPr lang="fr-CH" sz="2400" dirty="0">
+                <a:solidFill>
+                  <a:schemeClr val="tx1"/>
+                </a:solidFill>
+              </a:rPr>
+              <a:t> du côté serveur. </a:t>
+            </a:r>
+            <a:endParaRPr lang="fr-CH" sz="2400" dirty="0" smtClean="0">
+              <a:solidFill>
+                <a:schemeClr val="tx1"/>
+              </a:solidFill>
+            </a:endParaRPr>
+          </a:p>
+          <a:p>
+            <a:pPr lvl="3"/>
+            <a:r>
+              <a:rPr lang="fr-CH" sz="2400" dirty="0" smtClean="0">
+                <a:solidFill>
+                  <a:schemeClr val="tx1"/>
+                </a:solidFill>
+              </a:rPr>
+              <a:t>Les serveurs Play </a:t>
+            </a:r>
+            <a:r>
+              <a:rPr lang="fr-CH" sz="2400" dirty="0">
+                <a:solidFill>
+                  <a:schemeClr val="tx1"/>
+                </a:solidFill>
+              </a:rPr>
+              <a:t>peuvent </a:t>
+            </a:r>
+            <a:r>
+              <a:rPr lang="fr-CH" sz="2400" dirty="0" smtClean="0">
+                <a:solidFill>
+                  <a:schemeClr val="tx1"/>
+                </a:solidFill>
+              </a:rPr>
+              <a:t>répondre à n’importe quel requête client (léger)</a:t>
+            </a:r>
+          </a:p>
+          <a:p>
+            <a:pPr lvl="3"/>
+            <a:r>
+              <a:rPr lang="fr-CH" sz="2400" dirty="0" smtClean="0">
+                <a:solidFill>
+                  <a:schemeClr val="tx1"/>
+                </a:solidFill>
+              </a:rPr>
+              <a:t>Un EJB </a:t>
+            </a:r>
+            <a:r>
+              <a:rPr lang="fr-CH" sz="2400" dirty="0" err="1" smtClean="0">
+                <a:solidFill>
+                  <a:schemeClr val="tx1"/>
+                </a:solidFill>
+              </a:rPr>
+              <a:t>Stateful</a:t>
+            </a:r>
+            <a:r>
+              <a:rPr lang="fr-CH" sz="2400" dirty="0" smtClean="0">
+                <a:solidFill>
+                  <a:schemeClr val="tx1"/>
+                </a:solidFill>
+              </a:rPr>
+              <a:t> ne peut répondre et ne peut contenir que les données d’un seul client (lourd)</a:t>
             </a:r>
           </a:p>
         </p:txBody>
@@ -9255,6 +9677,444 @@
               <a:rPr lang="en-US" smtClean="0"/>
               <a:pPr/>
               <a:t>14</a:t>
+            </a:fld>
+            <a:endParaRPr lang="en-US" dirty="0"/>
+          </a:p>
+        </p:txBody>
+      </p:sp>
+    </p:spTree>
+    <p:extLst>
+      <p:ext uri="{BB962C8B-B14F-4D97-AF65-F5344CB8AC3E}">
+        <p14:creationId xmlns:p14="http://schemas.microsoft.com/office/powerpoint/2010/main" val="815469556"/>
+      </p:ext>
+    </p:extLst>
+  </p:cSld>
+  <p:clrMapOvr>
+    <a:masterClrMapping/>
+  </p:clrMapOvr>
+  <p:timing>
+    <p:tnLst>
+      <p:par>
+        <p:cTn id="1" dur="indefinite" restart="never" nodeType="tmRoot"/>
+      </p:par>
+    </p:tnLst>
+  </p:timing>
+</p:sld>
+</file>
+
+<file path=ppt/slides/slide15.xml><?xml version="1.0" encoding="utf-8"?>
+<p:sld xmlns:a="http://schemas.openxmlformats.org/drawingml/2006/main" xmlns:r="http://schemas.openxmlformats.org/officeDocument/2006/relationships" xmlns:p="http://schemas.openxmlformats.org/presentationml/2006/main">
+  <p:cSld>
+    <p:spTree>
+      <p:nvGrpSpPr>
+        <p:cNvPr id="1" name=""/>
+        <p:cNvGrpSpPr/>
+        <p:nvPr/>
+      </p:nvGrpSpPr>
+      <p:grpSpPr>
+        <a:xfrm>
+          <a:off x="0" y="0"/>
+          <a:ext cx="0" cy="0"/>
+          <a:chOff x="0" y="0"/>
+          <a:chExt cx="0" cy="0"/>
+        </a:xfrm>
+      </p:grpSpPr>
+      <p:sp>
+        <p:nvSpPr>
+          <p:cNvPr id="3" name="Espace réservé du contenu 2"/>
+          <p:cNvSpPr>
+            <a:spLocks noGrp="1"/>
+          </p:cNvSpPr>
+          <p:nvPr>
+            <p:ph idx="1"/>
+          </p:nvPr>
+        </p:nvSpPr>
+        <p:spPr>
+          <a:xfrm>
+            <a:off x="684212" y="1587500"/>
+            <a:ext cx="9564688" cy="4991100"/>
+          </a:xfrm>
+        </p:spPr>
+        <p:txBody>
+          <a:bodyPr>
+            <a:noAutofit/>
+          </a:bodyPr>
+          <a:lstStyle/>
+          <a:p>
+            <a:r>
+              <a:rPr lang="fr-CH" sz="2800" dirty="0" smtClean="0">
+                <a:solidFill>
+                  <a:schemeClr val="tx1"/>
+                </a:solidFill>
+              </a:rPr>
+              <a:t>Problèmes rencontrés?</a:t>
+            </a:r>
+          </a:p>
+          <a:p>
+            <a:pPr lvl="1"/>
+            <a:r>
+              <a:rPr lang="fr-CH" sz="2600" dirty="0">
+                <a:solidFill>
+                  <a:schemeClr val="tx1"/>
+                </a:solidFill>
+                <a:sym typeface="Wingdings" panose="05000000000000000000" pitchFamily="2" charset="2"/>
+              </a:rPr>
+              <a:t>Apache  </a:t>
+            </a:r>
+            <a:r>
+              <a:rPr lang="fr-CH" sz="2600" dirty="0" err="1">
+                <a:solidFill>
+                  <a:schemeClr val="tx1"/>
+                </a:solidFill>
+                <a:sym typeface="Wingdings" panose="05000000000000000000" pitchFamily="2" charset="2"/>
+              </a:rPr>
+              <a:t>Lighttpd</a:t>
+            </a:r>
+            <a:endParaRPr lang="fr-CH" sz="2600" dirty="0">
+              <a:solidFill>
+                <a:schemeClr val="tx1"/>
+              </a:solidFill>
+              <a:sym typeface="Wingdings" panose="05000000000000000000" pitchFamily="2" charset="2"/>
+            </a:endParaRPr>
+          </a:p>
+          <a:p>
+            <a:pPr lvl="2"/>
+            <a:r>
+              <a:rPr lang="fr-CH" sz="2400" dirty="0" err="1">
+                <a:solidFill>
+                  <a:schemeClr val="tx1"/>
+                </a:solidFill>
+                <a:sym typeface="Wingdings" panose="05000000000000000000" pitchFamily="2" charset="2"/>
+              </a:rPr>
+              <a:t>Lighttpd</a:t>
+            </a:r>
+            <a:r>
+              <a:rPr lang="fr-CH" sz="2400" dirty="0">
+                <a:solidFill>
+                  <a:schemeClr val="tx1"/>
+                </a:solidFill>
+                <a:sym typeface="Wingdings" panose="05000000000000000000" pitchFamily="2" charset="2"/>
+              </a:rPr>
+              <a:t> est plus </a:t>
+            </a:r>
+            <a:r>
+              <a:rPr lang="fr-CH" sz="2400" dirty="0" smtClean="0">
+                <a:solidFill>
+                  <a:schemeClr val="tx1"/>
+                </a:solidFill>
+                <a:sym typeface="Wingdings" panose="05000000000000000000" pitchFamily="2" charset="2"/>
+              </a:rPr>
+              <a:t>performant</a:t>
+            </a:r>
+          </a:p>
+          <a:p>
+            <a:pPr lvl="2"/>
+            <a:r>
+              <a:rPr lang="fr-CH" sz="2400" dirty="0">
+                <a:solidFill>
+                  <a:schemeClr val="tx1"/>
+                </a:solidFill>
+                <a:sym typeface="Wingdings" panose="05000000000000000000" pitchFamily="2" charset="2"/>
+              </a:rPr>
+              <a:t>P</a:t>
+            </a:r>
+            <a:r>
+              <a:rPr lang="fr-CH" sz="2400" dirty="0" smtClean="0">
+                <a:solidFill>
+                  <a:schemeClr val="tx1"/>
+                </a:solidFill>
+                <a:sym typeface="Wingdings" panose="05000000000000000000" pitchFamily="2" charset="2"/>
+              </a:rPr>
+              <a:t>lus </a:t>
+            </a:r>
+            <a:r>
+              <a:rPr lang="fr-CH" sz="2400" dirty="0">
+                <a:solidFill>
+                  <a:schemeClr val="tx1"/>
+                </a:solidFill>
+                <a:sym typeface="Wingdings" panose="05000000000000000000" pitchFamily="2" charset="2"/>
+              </a:rPr>
+              <a:t>facile à </a:t>
+            </a:r>
+            <a:r>
+              <a:rPr lang="fr-CH" sz="2400" dirty="0" smtClean="0">
+                <a:solidFill>
+                  <a:schemeClr val="tx1"/>
+                </a:solidFill>
+                <a:sym typeface="Wingdings" panose="05000000000000000000" pitchFamily="2" charset="2"/>
+              </a:rPr>
+              <a:t>configurer</a:t>
+            </a:r>
+            <a:endParaRPr lang="fr-CH" sz="2600" dirty="0" smtClean="0">
+              <a:solidFill>
+                <a:schemeClr val="tx1"/>
+              </a:solidFill>
+            </a:endParaRPr>
+          </a:p>
+          <a:p>
+            <a:pPr lvl="1"/>
+            <a:r>
+              <a:rPr lang="fr-CH" sz="2600" dirty="0" err="1" smtClean="0">
+                <a:solidFill>
+                  <a:schemeClr val="tx1"/>
+                </a:solidFill>
+              </a:rPr>
+              <a:t>Hibernate</a:t>
+            </a:r>
+            <a:r>
+              <a:rPr lang="fr-CH" sz="2600" dirty="0" smtClean="0">
+                <a:solidFill>
+                  <a:schemeClr val="tx1"/>
+                </a:solidFill>
+              </a:rPr>
+              <a:t> </a:t>
+            </a:r>
+            <a:r>
+              <a:rPr lang="fr-CH" sz="2600" dirty="0" smtClean="0">
+                <a:solidFill>
+                  <a:schemeClr val="tx1"/>
+                </a:solidFill>
+                <a:sym typeface="Wingdings" panose="05000000000000000000" pitchFamily="2" charset="2"/>
+              </a:rPr>
+              <a:t> </a:t>
+            </a:r>
+            <a:r>
+              <a:rPr lang="fr-CH" sz="2600" dirty="0" err="1" smtClean="0">
+                <a:solidFill>
+                  <a:schemeClr val="tx1"/>
+                </a:solidFill>
+                <a:sym typeface="Wingdings" panose="05000000000000000000" pitchFamily="2" charset="2"/>
+              </a:rPr>
+              <a:t>Ebean</a:t>
+            </a:r>
+            <a:endParaRPr lang="fr-CH" sz="2600" dirty="0" smtClean="0">
+              <a:solidFill>
+                <a:schemeClr val="tx1"/>
+              </a:solidFill>
+              <a:sym typeface="Wingdings" panose="05000000000000000000" pitchFamily="2" charset="2"/>
+            </a:endParaRPr>
+          </a:p>
+          <a:p>
+            <a:pPr lvl="2"/>
+            <a:r>
+              <a:rPr lang="fr-CH" sz="2400" dirty="0" smtClean="0">
+                <a:solidFill>
+                  <a:schemeClr val="tx1"/>
+                </a:solidFill>
+                <a:sym typeface="Wingdings" panose="05000000000000000000" pitchFamily="2" charset="2"/>
+              </a:rPr>
+              <a:t>Transaction exception </a:t>
+            </a:r>
+            <a:r>
+              <a:rPr lang="fr-CH" sz="2400" dirty="0" err="1" smtClean="0">
+                <a:solidFill>
+                  <a:schemeClr val="tx1"/>
+                </a:solidFill>
+                <a:sym typeface="Wingdings" panose="05000000000000000000" pitchFamily="2" charset="2"/>
+              </a:rPr>
+              <a:t>benchmarking</a:t>
+            </a:r>
+            <a:r>
+              <a:rPr lang="fr-CH" sz="2400" dirty="0" smtClean="0">
+                <a:solidFill>
+                  <a:schemeClr val="tx1"/>
+                </a:solidFill>
+                <a:sym typeface="Wingdings" panose="05000000000000000000" pitchFamily="2" charset="2"/>
+              </a:rPr>
+              <a:t> &gt; 10 thread</a:t>
+            </a:r>
+          </a:p>
+          <a:p>
+            <a:pPr lvl="1"/>
+            <a:r>
+              <a:rPr lang="fr-CH" sz="2600" dirty="0" err="1" smtClean="0">
+                <a:solidFill>
+                  <a:schemeClr val="tx1"/>
+                </a:solidFill>
+                <a:sym typeface="Wingdings" panose="05000000000000000000" pitchFamily="2" charset="2"/>
+              </a:rPr>
+              <a:t>EHCache</a:t>
+            </a:r>
+            <a:r>
+              <a:rPr lang="fr-CH" sz="2600" dirty="0" smtClean="0">
+                <a:solidFill>
+                  <a:schemeClr val="tx1"/>
+                </a:solidFill>
+                <a:sym typeface="Wingdings" panose="05000000000000000000" pitchFamily="2" charset="2"/>
+              </a:rPr>
+              <a:t>  </a:t>
+            </a:r>
+            <a:r>
+              <a:rPr lang="fr-CH" sz="2600" dirty="0" err="1" smtClean="0">
+                <a:solidFill>
+                  <a:schemeClr val="tx1"/>
+                </a:solidFill>
+                <a:sym typeface="Wingdings" panose="05000000000000000000" pitchFamily="2" charset="2"/>
+              </a:rPr>
+              <a:t>Memcached</a:t>
+            </a:r>
+            <a:endParaRPr lang="fr-CH" sz="2600" dirty="0" smtClean="0">
+              <a:solidFill>
+                <a:schemeClr val="tx1"/>
+              </a:solidFill>
+              <a:sym typeface="Wingdings" panose="05000000000000000000" pitchFamily="2" charset="2"/>
+            </a:endParaRPr>
+          </a:p>
+          <a:p>
+            <a:pPr lvl="2"/>
+            <a:r>
+              <a:rPr lang="fr-CH" sz="2400" dirty="0" smtClean="0">
+                <a:solidFill>
+                  <a:schemeClr val="tx1"/>
+                </a:solidFill>
+                <a:sym typeface="Wingdings" panose="05000000000000000000" pitchFamily="2" charset="2"/>
+              </a:rPr>
+              <a:t>Documentation incomplète</a:t>
+            </a:r>
+          </a:p>
+          <a:p>
+            <a:pPr lvl="3"/>
+            <a:r>
+              <a:rPr lang="fr-CH" sz="2200" dirty="0" smtClean="0">
+                <a:solidFill>
+                  <a:schemeClr val="tx1"/>
+                </a:solidFill>
+                <a:sym typeface="Wingdings" panose="05000000000000000000" pitchFamily="2" charset="2"/>
+              </a:rPr>
+              <a:t>Procédure configuration avec java inexistante</a:t>
+            </a:r>
+          </a:p>
+          <a:p>
+            <a:pPr lvl="3"/>
+            <a:r>
+              <a:rPr lang="fr-CH" sz="2200" dirty="0" smtClean="0">
+                <a:solidFill>
+                  <a:schemeClr val="tx1"/>
+                </a:solidFill>
+                <a:sym typeface="Wingdings" panose="05000000000000000000" pitchFamily="2" charset="2"/>
+              </a:rPr>
+              <a:t>Pas d’explication sur l'utilisation </a:t>
+            </a:r>
+            <a:r>
+              <a:rPr lang="fr-CH" sz="2200" dirty="0">
+                <a:solidFill>
+                  <a:schemeClr val="tx1"/>
+                </a:solidFill>
+                <a:sym typeface="Wingdings" panose="05000000000000000000" pitchFamily="2" charset="2"/>
+              </a:rPr>
+              <a:t>de </a:t>
+            </a:r>
+            <a:r>
+              <a:rPr lang="fr-CH" sz="2200" dirty="0" err="1">
+                <a:solidFill>
+                  <a:schemeClr val="tx1"/>
+                </a:solidFill>
+                <a:sym typeface="Wingdings" panose="05000000000000000000" pitchFamily="2" charset="2"/>
+              </a:rPr>
+              <a:t>EHCache</a:t>
+            </a:r>
+            <a:r>
+              <a:rPr lang="fr-CH" sz="2200" dirty="0">
+                <a:solidFill>
+                  <a:schemeClr val="tx1"/>
+                </a:solidFill>
+                <a:sym typeface="Wingdings" panose="05000000000000000000" pitchFamily="2" charset="2"/>
+              </a:rPr>
+              <a:t> en </a:t>
+            </a:r>
+            <a:r>
+              <a:rPr lang="fr-CH" sz="2200" dirty="0" smtClean="0">
+                <a:solidFill>
+                  <a:schemeClr val="tx1"/>
+                </a:solidFill>
+                <a:sym typeface="Wingdings" panose="05000000000000000000" pitchFamily="2" charset="2"/>
+              </a:rPr>
+              <a:t>cluster</a:t>
+            </a:r>
+          </a:p>
+          <a:p>
+            <a:pPr lvl="2"/>
+            <a:r>
+              <a:rPr lang="fr-CH" sz="2400" dirty="0" smtClean="0">
+                <a:solidFill>
+                  <a:schemeClr val="tx1"/>
+                </a:solidFill>
+                <a:sym typeface="Wingdings" panose="05000000000000000000" pitchFamily="2" charset="2"/>
+              </a:rPr>
+              <a:t>Communauté conseil </a:t>
+            </a:r>
+            <a:r>
+              <a:rPr lang="fr-CH" sz="2400" dirty="0" err="1" smtClean="0">
+                <a:solidFill>
+                  <a:schemeClr val="tx1"/>
+                </a:solidFill>
+                <a:sym typeface="Wingdings" panose="05000000000000000000" pitchFamily="2" charset="2"/>
+              </a:rPr>
+              <a:t>Memcached</a:t>
+            </a:r>
+            <a:endParaRPr lang="fr-CH" sz="2400" dirty="0" smtClean="0">
+              <a:solidFill>
+                <a:schemeClr val="tx1"/>
+              </a:solidFill>
+              <a:sym typeface="Wingdings" panose="05000000000000000000" pitchFamily="2" charset="2"/>
+            </a:endParaRPr>
+          </a:p>
+          <a:p>
+            <a:pPr lvl="3"/>
+            <a:r>
+              <a:rPr lang="fr-CH" sz="2200" dirty="0">
+                <a:solidFill>
+                  <a:schemeClr val="tx1"/>
+                </a:solidFill>
+                <a:sym typeface="Wingdings" panose="05000000000000000000" pitchFamily="2" charset="2"/>
+              </a:rPr>
+              <a:t>Meilleures performances</a:t>
+            </a:r>
+            <a:endParaRPr lang="fr-CH" sz="2200" dirty="0" smtClean="0">
+              <a:solidFill>
+                <a:schemeClr val="tx1"/>
+              </a:solidFill>
+              <a:sym typeface="Wingdings" panose="05000000000000000000" pitchFamily="2" charset="2"/>
+            </a:endParaRPr>
+          </a:p>
+          <a:p>
+            <a:pPr lvl="3"/>
+            <a:endParaRPr lang="fr-CH" sz="2200" dirty="0" smtClean="0">
+              <a:solidFill>
+                <a:schemeClr val="tx1"/>
+              </a:solidFill>
+              <a:sym typeface="Wingdings" panose="05000000000000000000" pitchFamily="2" charset="2"/>
+            </a:endParaRPr>
+          </a:p>
+          <a:p>
+            <a:pPr lvl="1"/>
+            <a:endParaRPr lang="fr-CH" sz="2600" dirty="0" smtClean="0">
+              <a:solidFill>
+                <a:schemeClr val="tx1"/>
+              </a:solidFill>
+            </a:endParaRPr>
+          </a:p>
+        </p:txBody>
+      </p:sp>
+      <p:sp>
+        <p:nvSpPr>
+          <p:cNvPr id="5" name="Espace réservé du numéro de diapositive 4"/>
+          <p:cNvSpPr>
+            <a:spLocks noGrp="1"/>
+          </p:cNvSpPr>
+          <p:nvPr>
+            <p:ph type="sldNum" sz="quarter" idx="12"/>
+          </p:nvPr>
+        </p:nvSpPr>
+        <p:spPr/>
+        <p:txBody>
+          <a:bodyPr/>
+          <a:lstStyle/>
+          <a:p>
+            <a:fld id="{D57F1E4F-1CFF-5643-939E-217C01CDF565}" type="slidenum">
+              <a:rPr lang="en-US" smtClean="0"/>
+              <a:pPr/>
+              <a:t>15</a:t>
             </a:fld>
             <a:endParaRPr lang="en-US" dirty="0"/>
           </a:p>
@@ -9273,7 +10133,107 @@
   <p:timing>
     <p:tnLst>
       <p:par>
-        <p:cTn xmlns:p14="http://schemas.microsoft.com/office/powerpoint/2010/main" id="1" dur="indefinite" restart="never" nodeType="tmRoot"/>
+        <p:cTn id="1" dur="indefinite" restart="never" nodeType="tmRoot"/>
+      </p:par>
+    </p:tnLst>
+  </p:timing>
+</p:sld>
+</file>
+
+<file path=ppt/slides/slide16.xml><?xml version="1.0" encoding="utf-8"?>
+<p:sld xmlns:a="http://schemas.openxmlformats.org/drawingml/2006/main" xmlns:r="http://schemas.openxmlformats.org/officeDocument/2006/relationships" xmlns:p="http://schemas.openxmlformats.org/presentationml/2006/main">
+  <p:cSld>
+    <p:spTree>
+      <p:nvGrpSpPr>
+        <p:cNvPr id="1" name=""/>
+        <p:cNvGrpSpPr/>
+        <p:nvPr/>
+      </p:nvGrpSpPr>
+      <p:grpSpPr>
+        <a:xfrm>
+          <a:off x="0" y="0"/>
+          <a:ext cx="0" cy="0"/>
+          <a:chOff x="0" y="0"/>
+          <a:chExt cx="0" cy="0"/>
+        </a:xfrm>
+      </p:grpSpPr>
+      <p:sp>
+        <p:nvSpPr>
+          <p:cNvPr id="3" name="Espace réservé du contenu 2"/>
+          <p:cNvSpPr>
+            <a:spLocks noGrp="1"/>
+          </p:cNvSpPr>
+          <p:nvPr>
+            <p:ph idx="1"/>
+          </p:nvPr>
+        </p:nvSpPr>
+        <p:spPr>
+          <a:xfrm>
+            <a:off x="684212" y="685800"/>
+            <a:ext cx="8534400" cy="5803900"/>
+          </a:xfrm>
+        </p:spPr>
+        <p:txBody>
+          <a:bodyPr>
+            <a:noAutofit/>
+          </a:bodyPr>
+          <a:lstStyle/>
+          <a:p>
+            <a:pPr lvl="1"/>
+            <a:r>
+              <a:rPr lang="fr-CH" sz="2600" dirty="0" smtClean="0">
+                <a:solidFill>
+                  <a:schemeClr val="tx1"/>
+                </a:solidFill>
+              </a:rPr>
+              <a:t>Question?</a:t>
+            </a:r>
+            <a:endParaRPr lang="fr-CH" sz="2400" dirty="0" smtClean="0">
+              <a:solidFill>
+                <a:schemeClr val="tx1"/>
+              </a:solidFill>
+            </a:endParaRPr>
+          </a:p>
+        </p:txBody>
+      </p:sp>
+      <p:sp>
+        <p:nvSpPr>
+          <p:cNvPr id="5" name="Espace réservé du numéro de diapositive 4"/>
+          <p:cNvSpPr>
+            <a:spLocks noGrp="1"/>
+          </p:cNvSpPr>
+          <p:nvPr>
+            <p:ph type="sldNum" sz="quarter" idx="12"/>
+          </p:nvPr>
+        </p:nvSpPr>
+        <p:spPr/>
+        <p:txBody>
+          <a:bodyPr/>
+          <a:lstStyle/>
+          <a:p>
+            <a:fld id="{D57F1E4F-1CFF-5643-939E-217C01CDF565}" type="slidenum">
+              <a:rPr lang="en-US" smtClean="0"/>
+              <a:pPr/>
+              <a:t>16</a:t>
+            </a:fld>
+            <a:endParaRPr lang="en-US" dirty="0"/>
+          </a:p>
+        </p:txBody>
+      </p:sp>
+    </p:spTree>
+    <p:extLst>
+      <p:ext uri="{BB962C8B-B14F-4D97-AF65-F5344CB8AC3E}">
+        <p14:creationId xmlns:p14="http://schemas.microsoft.com/office/powerpoint/2010/main" val="2057533108"/>
+      </p:ext>
+    </p:extLst>
+  </p:cSld>
+  <p:clrMapOvr>
+    <a:masterClrMapping/>
+  </p:clrMapOvr>
+  <p:timing>
+    <p:tnLst>
+      <p:par>
+        <p:cTn id="1" dur="indefinite" restart="never" nodeType="tmRoot"/>
       </p:par>
     </p:tnLst>
   </p:timing>
@@ -9453,7 +10413,7 @@
   <p:timing>
     <p:tnLst>
       <p:par>
-        <p:cTn xmlns:p14="http://schemas.microsoft.com/office/powerpoint/2010/main" id="1" dur="indefinite" restart="never" nodeType="tmRoot"/>
+        <p:cTn id="1" dur="indefinite" restart="never" nodeType="tmRoot"/>
       </p:par>
     </p:tnLst>
   </p:timing>
@@ -9627,7 +10587,7 @@
   <p:timing>
     <p:tnLst>
       <p:par>
-        <p:cTn xmlns:p14="http://schemas.microsoft.com/office/powerpoint/2010/main" id="1" dur="indefinite" restart="never" nodeType="tmRoot"/>
+        <p:cTn id="1" dur="indefinite" restart="never" nodeType="tmRoot"/>
       </p:par>
     </p:tnLst>
   </p:timing>
@@ -9734,23 +10694,40 @@
             </a:endParaRPr>
           </a:p>
           <a:p>
+            <a:pPr lvl="1"/>
+            <a:r>
+              <a:rPr lang="fr-CH" sz="2400" dirty="0" smtClean="0">
+                <a:solidFill>
+                  <a:schemeClr val="tx1"/>
+                </a:solidFill>
+                <a:sym typeface="Wingdings" panose="05000000000000000000" pitchFamily="2" charset="2"/>
+              </a:rPr>
+              <a:t>API </a:t>
+            </a:r>
+            <a:r>
+              <a:rPr lang="fr-CH" sz="2400" dirty="0" smtClean="0">
+                <a:solidFill>
+                  <a:schemeClr val="tx1"/>
+                </a:solidFill>
+                <a:sym typeface="Wingdings" panose="05000000000000000000" pitchFamily="2" charset="2"/>
+              </a:rPr>
+              <a:t>avec 2 types de ressources :</a:t>
+            </a:r>
+          </a:p>
+          <a:p>
             <a:pPr lvl="2"/>
             <a:r>
-              <a:rPr lang="fr-CH" sz="2200" dirty="0" err="1" smtClean="0">
-                <a:solidFill>
-                  <a:schemeClr val="tx1"/>
-                </a:solidFill>
-              </a:rPr>
-              <a:t>Hibernate</a:t>
-            </a:r>
-            <a:r>
               <a:rPr lang="fr-CH" sz="2200" dirty="0" smtClean="0">
                 <a:solidFill>
                   <a:schemeClr val="tx1"/>
                 </a:solidFill>
-              </a:rPr>
-              <a:t> </a:t>
-            </a:r>
+                <a:sym typeface="Wingdings" panose="05000000000000000000" pitchFamily="2" charset="2"/>
+              </a:rPr>
+              <a:t>Élèves</a:t>
+            </a:r>
+          </a:p>
+          <a:p>
+            <a:pPr lvl="2"/>
             <a:r>
               <a:rPr lang="fr-CH" sz="2200" dirty="0" smtClean="0">
                 <a:solidFill>
@@ -9758,60 +10735,30 @@
                 </a:solidFill>
                 <a:sym typeface="Wingdings" panose="05000000000000000000" pitchFamily="2" charset="2"/>
               </a:rPr>
-              <a:t> </a:t>
-            </a:r>
-            <a:r>
-              <a:rPr lang="fr-CH" sz="2200" dirty="0" err="1" smtClean="0">
+              <a:t>Cours</a:t>
+            </a:r>
+          </a:p>
+          <a:p>
+            <a:pPr lvl="1"/>
+            <a:r>
+              <a:rPr lang="fr-CH" sz="2400" dirty="0" smtClean="0">
                 <a:solidFill>
                   <a:schemeClr val="tx1"/>
                 </a:solidFill>
                 <a:sym typeface="Wingdings" panose="05000000000000000000" pitchFamily="2" charset="2"/>
               </a:rPr>
-              <a:t>Ebean</a:t>
-            </a:r>
-            <a:endParaRPr lang="fr-CH" sz="2200" dirty="0" smtClean="0">
-              <a:solidFill>
-                <a:schemeClr val="tx1"/>
-              </a:solidFill>
-              <a:sym typeface="Wingdings" panose="05000000000000000000" pitchFamily="2" charset="2"/>
-            </a:endParaRPr>
-          </a:p>
-          <a:p>
-            <a:pPr lvl="1"/>
-            <a:r>
-              <a:rPr lang="fr-CH" sz="2400" dirty="0" smtClean="0">
+              <a:t>Documentation </a:t>
+            </a:r>
+            <a:r>
+              <a:rPr lang="fr-CH" sz="2400" dirty="0" err="1" smtClean="0">
                 <a:solidFill>
                   <a:schemeClr val="tx1"/>
                 </a:solidFill>
                 <a:sym typeface="Wingdings" panose="05000000000000000000" pitchFamily="2" charset="2"/>
               </a:rPr>
-              <a:t>API avec 2 types de ressources :</a:t>
-            </a:r>
-          </a:p>
-          <a:p>
-            <a:pPr lvl="2"/>
-            <a:r>
-              <a:rPr lang="fr-CH" sz="2200" dirty="0" smtClean="0">
-                <a:solidFill>
-                  <a:schemeClr val="tx1"/>
-                </a:solidFill>
-                <a:sym typeface="Wingdings" panose="05000000000000000000" pitchFamily="2" charset="2"/>
-              </a:rPr>
-              <a:t>Élèves</a:t>
-            </a:r>
-          </a:p>
-          <a:p>
-            <a:pPr lvl="2"/>
-            <a:r>
-              <a:rPr lang="fr-CH" sz="2200" dirty="0" smtClean="0">
-                <a:solidFill>
-                  <a:schemeClr val="tx1"/>
-                </a:solidFill>
-                <a:sym typeface="Wingdings" panose="05000000000000000000" pitchFamily="2" charset="2"/>
-              </a:rPr>
-              <a:t>Cours</a:t>
-            </a:r>
-            <a:endParaRPr lang="fr-CH" sz="2200" dirty="0">
+              <a:t>Apiary</a:t>
+            </a:r>
+            <a:endParaRPr lang="fr-CH" sz="2400" dirty="0">
               <a:solidFill>
                 <a:schemeClr val="tx1"/>
               </a:solidFill>
@@ -9856,7 +10803,7 @@
   <p:timing>
     <p:tnLst>
       <p:par>
-        <p:cTn xmlns:p14="http://schemas.microsoft.com/office/powerpoint/2010/main" id="1" dur="indefinite" restart="never" nodeType="tmRoot"/>
+        <p:cTn id="1" dur="indefinite" restart="never" nodeType="tmRoot"/>
       </p:par>
     </p:tnLst>
   </p:timing>
@@ -10073,7 +11020,7 @@
   <p:timing>
     <p:tnLst>
       <p:par>
-        <p:cTn xmlns:p14="http://schemas.microsoft.com/office/powerpoint/2010/main" id="1" dur="indefinite" restart="never" nodeType="tmRoot"/>
+        <p:cTn id="1" dur="indefinite" restart="never" nodeType="tmRoot"/>
       </p:par>
     </p:tnLst>
   </p:timing>
@@ -10285,7 +11232,7 @@
   <p:timing>
     <p:tnLst>
       <p:par>
-        <p:cTn xmlns:p14="http://schemas.microsoft.com/office/powerpoint/2010/main" id="1" dur="indefinite" restart="never" nodeType="tmRoot"/>
+        <p:cTn id="1" dur="indefinite" restart="never" nodeType="tmRoot"/>
       </p:par>
     </p:tnLst>
   </p:timing>
@@ -10497,7 +11444,7 @@
   <p:timing>
     <p:tnLst>
       <p:par>
-        <p:cTn xmlns:p14="http://schemas.microsoft.com/office/powerpoint/2010/main" id="1" dur="indefinite" restart="never" nodeType="tmRoot"/>
+        <p:cTn id="1" dur="indefinite" restart="never" nodeType="tmRoot"/>
       </p:par>
     </p:tnLst>
   </p:timing>
@@ -10809,7 +11756,7 @@
   <p:timing>
     <p:tnLst>
       <p:par>
-        <p:cTn xmlns:p14="http://schemas.microsoft.com/office/powerpoint/2010/main" id="1" dur="indefinite" restart="never" nodeType="tmRoot"/>
+        <p:cTn id="1" dur="indefinite" restart="never" nodeType="tmRoot"/>
       </p:par>
     </p:tnLst>
   </p:timing>
@@ -11053,7 +12000,7 @@
   <p:timing>
     <p:tnLst>
       <p:par>
-        <p:cTn xmlns:p14="http://schemas.microsoft.com/office/powerpoint/2010/main" id="1" dur="indefinite" restart="never" nodeType="tmRoot"/>
+        <p:cTn id="1" dur="indefinite" restart="never" nodeType="tmRoot"/>
       </p:par>
     </p:tnLst>
   </p:timing>
@@ -11328,7 +12275,7 @@
   <a:extraClrSchemeLst/>
   <a:extLst>
     <a:ext uri="{05A4C25C-085E-4340-85A3-A5531E510DB2}">
-      <thm15:themeFamily xmlns="" xmlns:thm15="http://schemas.microsoft.com/office/thememl/2012/main" name="Slice" id="{0507925B-6AC9-4358-8E18-C330545D08F8}" vid="{13FEC7C6-62A9-40C4-99D2-581AACACAA2F}"/>
+      <thm15:themeFamily xmlns:thm15="http://schemas.microsoft.com/office/thememl/2012/main" name="Slice" id="{0507925B-6AC9-4358-8E18-C330545D08F8}" vid="{13FEC7C6-62A9-40C4-99D2-581AACACAA2F}"/>
     </a:ext>
   </a:extLst>
 </a:theme>
@@ -11589,7 +12536,7 @@
   <a:extraClrSchemeLst/>
   <a:extLst>
     <a:ext uri="{05A4C25C-085E-4340-85A3-A5531E510DB2}">
-      <thm15:themeFamily xmlns="" xmlns:thm15="http://schemas.microsoft.com/office/thememl/2012/main" name="Office Theme" id="{62F939B6-93AF-4DB8-9C6B-D6C7DFDC589F}" vid="{4A3C46E8-61CC-4603-A589-7422A47A8E4A}"/>
+      <thm15:themeFamily xmlns:thm15="http://schemas.microsoft.com/office/thememl/2012/main" name="Office Theme" id="{62F939B6-93AF-4DB8-9C6B-D6C7DFDC589F}" vid="{4A3C46E8-61CC-4603-A589-7422A47A8E4A}"/>
     </a:ext>
   </a:extLst>
 </a:theme>

</xml_diff>